<commit_message>
Präsentation und Anhang Ergänzung
</commit_message>
<xml_diff>
--- a/12-Skymensions-JanzenQuanzJonetzko.pptx
+++ b/12-Skymensions-JanzenQuanzJonetzko.pptx
@@ -12,8 +12,10 @@
     <p:sldId id="267" r:id="rId6"/>
     <p:sldId id="268" r:id="rId7"/>
     <p:sldId id="265" r:id="rId8"/>
-    <p:sldId id="266" r:id="rId9"/>
-    <p:sldId id="261" r:id="rId10"/>
+    <p:sldId id="269" r:id="rId9"/>
+    <p:sldId id="270" r:id="rId10"/>
+    <p:sldId id="266" r:id="rId11"/>
+    <p:sldId id="261" r:id="rId12"/>
   </p:sldIdLst>
   <p:sldSz cx="12192000" cy="6858000"/>
   <p:notesSz cx="6858000" cy="9144000"/>
@@ -162,10 +164,9 @@
           </a:lstStyle>
           <a:p>
             <a:r>
-              <a:rPr lang="de-DE" smtClean="0"/>
+              <a:rPr lang="de-DE"/>
               <a:t>Titelmasterformat durch Klicken bearbeiten</a:t>
             </a:r>
-            <a:endParaRPr lang="de-DE"/>
           </a:p>
         </p:txBody>
       </p:sp>
@@ -227,10 +228,9 @@
           </a:lstStyle>
           <a:p>
             <a:r>
-              <a:rPr lang="de-DE" smtClean="0"/>
+              <a:rPr lang="de-DE"/>
               <a:t>Formatvorlage des Untertitelmasters durch Klicken bearbeiten</a:t>
             </a:r>
-            <a:endParaRPr lang="de-DE"/>
           </a:p>
         </p:txBody>
       </p:sp>
@@ -345,10 +345,9 @@
           <a:lstStyle/>
           <a:p>
             <a:r>
-              <a:rPr lang="de-DE" smtClean="0"/>
+              <a:rPr lang="de-DE"/>
               <a:t>Titelmasterformat durch Klicken bearbeiten</a:t>
             </a:r>
-            <a:endParaRPr lang="de-DE"/>
           </a:p>
         </p:txBody>
       </p:sp>
@@ -369,38 +368,37 @@
           <a:p>
             <a:pPr lvl="0"/>
             <a:r>
-              <a:rPr lang="de-DE" smtClean="0"/>
+              <a:rPr lang="de-DE"/>
               <a:t>Textmasterformat bearbeiten</a:t>
             </a:r>
           </a:p>
           <a:p>
             <a:pPr lvl="1"/>
             <a:r>
-              <a:rPr lang="de-DE" smtClean="0"/>
+              <a:rPr lang="de-DE"/>
               <a:t>Zweite Ebene</a:t>
             </a:r>
           </a:p>
           <a:p>
             <a:pPr lvl="2"/>
             <a:r>
-              <a:rPr lang="de-DE" smtClean="0"/>
+              <a:rPr lang="de-DE"/>
               <a:t>Dritte Ebene</a:t>
             </a:r>
           </a:p>
           <a:p>
             <a:pPr lvl="3"/>
             <a:r>
-              <a:rPr lang="de-DE" smtClean="0"/>
+              <a:rPr lang="de-DE"/>
               <a:t>Vierte Ebene</a:t>
             </a:r>
           </a:p>
           <a:p>
             <a:pPr lvl="4"/>
             <a:r>
-              <a:rPr lang="de-DE" smtClean="0"/>
+              <a:rPr lang="de-DE"/>
               <a:t>Fünfte Ebene</a:t>
             </a:r>
-            <a:endParaRPr lang="de-DE"/>
           </a:p>
         </p:txBody>
       </p:sp>
@@ -520,10 +518,9 @@
           <a:lstStyle/>
           <a:p>
             <a:r>
-              <a:rPr lang="de-DE" smtClean="0"/>
+              <a:rPr lang="de-DE"/>
               <a:t>Titelmasterformat durch Klicken bearbeiten</a:t>
             </a:r>
-            <a:endParaRPr lang="de-DE"/>
           </a:p>
         </p:txBody>
       </p:sp>
@@ -549,38 +546,37 @@
           <a:p>
             <a:pPr lvl="0"/>
             <a:r>
-              <a:rPr lang="de-DE" smtClean="0"/>
+              <a:rPr lang="de-DE"/>
               <a:t>Textmasterformat bearbeiten</a:t>
             </a:r>
           </a:p>
           <a:p>
             <a:pPr lvl="1"/>
             <a:r>
-              <a:rPr lang="de-DE" smtClean="0"/>
+              <a:rPr lang="de-DE"/>
               <a:t>Zweite Ebene</a:t>
             </a:r>
           </a:p>
           <a:p>
             <a:pPr lvl="2"/>
             <a:r>
-              <a:rPr lang="de-DE" smtClean="0"/>
+              <a:rPr lang="de-DE"/>
               <a:t>Dritte Ebene</a:t>
             </a:r>
           </a:p>
           <a:p>
             <a:pPr lvl="3"/>
             <a:r>
-              <a:rPr lang="de-DE" smtClean="0"/>
+              <a:rPr lang="de-DE"/>
               <a:t>Vierte Ebene</a:t>
             </a:r>
           </a:p>
           <a:p>
             <a:pPr lvl="4"/>
             <a:r>
-              <a:rPr lang="de-DE" smtClean="0"/>
+              <a:rPr lang="de-DE"/>
               <a:t>Fünfte Ebene</a:t>
             </a:r>
-            <a:endParaRPr lang="de-DE"/>
           </a:p>
         </p:txBody>
       </p:sp>
@@ -695,10 +691,9 @@
           <a:lstStyle/>
           <a:p>
             <a:r>
-              <a:rPr lang="de-DE" smtClean="0"/>
+              <a:rPr lang="de-DE"/>
               <a:t>Titelmasterformat durch Klicken bearbeiten</a:t>
             </a:r>
-            <a:endParaRPr lang="de-DE"/>
           </a:p>
         </p:txBody>
       </p:sp>
@@ -719,38 +714,37 @@
           <a:p>
             <a:pPr lvl="0"/>
             <a:r>
-              <a:rPr lang="de-DE" smtClean="0"/>
+              <a:rPr lang="de-DE"/>
               <a:t>Textmasterformat bearbeiten</a:t>
             </a:r>
           </a:p>
           <a:p>
             <a:pPr lvl="1"/>
             <a:r>
-              <a:rPr lang="de-DE" smtClean="0"/>
+              <a:rPr lang="de-DE"/>
               <a:t>Zweite Ebene</a:t>
             </a:r>
           </a:p>
           <a:p>
             <a:pPr lvl="2"/>
             <a:r>
-              <a:rPr lang="de-DE" smtClean="0"/>
+              <a:rPr lang="de-DE"/>
               <a:t>Dritte Ebene</a:t>
             </a:r>
           </a:p>
           <a:p>
             <a:pPr lvl="3"/>
             <a:r>
-              <a:rPr lang="de-DE" smtClean="0"/>
+              <a:rPr lang="de-DE"/>
               <a:t>Vierte Ebene</a:t>
             </a:r>
           </a:p>
           <a:p>
             <a:pPr lvl="4"/>
             <a:r>
-              <a:rPr lang="de-DE" smtClean="0"/>
+              <a:rPr lang="de-DE"/>
               <a:t>Fünfte Ebene</a:t>
             </a:r>
-            <a:endParaRPr lang="de-DE"/>
           </a:p>
         </p:txBody>
       </p:sp>
@@ -874,10 +868,9 @@
           </a:lstStyle>
           <a:p>
             <a:r>
-              <a:rPr lang="de-DE" smtClean="0"/>
+              <a:rPr lang="de-DE"/>
               <a:t>Titelmasterformat durch Klicken bearbeiten</a:t>
             </a:r>
-            <a:endParaRPr lang="de-DE"/>
           </a:p>
         </p:txBody>
       </p:sp>
@@ -994,7 +987,7 @@
           <a:p>
             <a:pPr lvl="0"/>
             <a:r>
-              <a:rPr lang="de-DE" smtClean="0"/>
+              <a:rPr lang="de-DE"/>
               <a:t>Textmasterformat bearbeiten</a:t>
             </a:r>
           </a:p>
@@ -1111,10 +1104,9 @@
           <a:lstStyle/>
           <a:p>
             <a:r>
-              <a:rPr lang="de-DE" smtClean="0"/>
+              <a:rPr lang="de-DE"/>
               <a:t>Titelmasterformat durch Klicken bearbeiten</a:t>
             </a:r>
-            <a:endParaRPr lang="de-DE"/>
           </a:p>
         </p:txBody>
       </p:sp>
@@ -1140,38 +1132,37 @@
           <a:p>
             <a:pPr lvl="0"/>
             <a:r>
-              <a:rPr lang="de-DE" smtClean="0"/>
+              <a:rPr lang="de-DE"/>
               <a:t>Textmasterformat bearbeiten</a:t>
             </a:r>
           </a:p>
           <a:p>
             <a:pPr lvl="1"/>
             <a:r>
-              <a:rPr lang="de-DE" smtClean="0"/>
+              <a:rPr lang="de-DE"/>
               <a:t>Zweite Ebene</a:t>
             </a:r>
           </a:p>
           <a:p>
             <a:pPr lvl="2"/>
             <a:r>
-              <a:rPr lang="de-DE" smtClean="0"/>
+              <a:rPr lang="de-DE"/>
               <a:t>Dritte Ebene</a:t>
             </a:r>
           </a:p>
           <a:p>
             <a:pPr lvl="3"/>
             <a:r>
-              <a:rPr lang="de-DE" smtClean="0"/>
+              <a:rPr lang="de-DE"/>
               <a:t>Vierte Ebene</a:t>
             </a:r>
           </a:p>
           <a:p>
             <a:pPr lvl="4"/>
             <a:r>
-              <a:rPr lang="de-DE" smtClean="0"/>
+              <a:rPr lang="de-DE"/>
               <a:t>Fünfte Ebene</a:t>
             </a:r>
-            <a:endParaRPr lang="de-DE"/>
           </a:p>
         </p:txBody>
       </p:sp>
@@ -1197,38 +1188,37 @@
           <a:p>
             <a:pPr lvl="0"/>
             <a:r>
-              <a:rPr lang="de-DE" smtClean="0"/>
+              <a:rPr lang="de-DE"/>
               <a:t>Textmasterformat bearbeiten</a:t>
             </a:r>
           </a:p>
           <a:p>
             <a:pPr lvl="1"/>
             <a:r>
-              <a:rPr lang="de-DE" smtClean="0"/>
+              <a:rPr lang="de-DE"/>
               <a:t>Zweite Ebene</a:t>
             </a:r>
           </a:p>
           <a:p>
             <a:pPr lvl="2"/>
             <a:r>
-              <a:rPr lang="de-DE" smtClean="0"/>
+              <a:rPr lang="de-DE"/>
               <a:t>Dritte Ebene</a:t>
             </a:r>
           </a:p>
           <a:p>
             <a:pPr lvl="3"/>
             <a:r>
-              <a:rPr lang="de-DE" smtClean="0"/>
+              <a:rPr lang="de-DE"/>
               <a:t>Vierte Ebene</a:t>
             </a:r>
           </a:p>
           <a:p>
             <a:pPr lvl="4"/>
             <a:r>
-              <a:rPr lang="de-DE" smtClean="0"/>
+              <a:rPr lang="de-DE"/>
               <a:t>Fünfte Ebene</a:t>
             </a:r>
-            <a:endParaRPr lang="de-DE"/>
           </a:p>
         </p:txBody>
       </p:sp>
@@ -1348,10 +1338,9 @@
           <a:lstStyle/>
           <a:p>
             <a:r>
-              <a:rPr lang="de-DE" smtClean="0"/>
+              <a:rPr lang="de-DE"/>
               <a:t>Titelmasterformat durch Klicken bearbeiten</a:t>
             </a:r>
-            <a:endParaRPr lang="de-DE"/>
           </a:p>
         </p:txBody>
       </p:sp>
@@ -1414,7 +1403,7 @@
           <a:p>
             <a:pPr lvl="0"/>
             <a:r>
-              <a:rPr lang="de-DE" smtClean="0"/>
+              <a:rPr lang="de-DE"/>
               <a:t>Textmasterformat bearbeiten</a:t>
             </a:r>
           </a:p>
@@ -1442,38 +1431,37 @@
           <a:p>
             <a:pPr lvl="0"/>
             <a:r>
-              <a:rPr lang="de-DE" smtClean="0"/>
+              <a:rPr lang="de-DE"/>
               <a:t>Textmasterformat bearbeiten</a:t>
             </a:r>
           </a:p>
           <a:p>
             <a:pPr lvl="1"/>
             <a:r>
-              <a:rPr lang="de-DE" smtClean="0"/>
+              <a:rPr lang="de-DE"/>
               <a:t>Zweite Ebene</a:t>
             </a:r>
           </a:p>
           <a:p>
             <a:pPr lvl="2"/>
             <a:r>
-              <a:rPr lang="de-DE" smtClean="0"/>
+              <a:rPr lang="de-DE"/>
               <a:t>Dritte Ebene</a:t>
             </a:r>
           </a:p>
           <a:p>
             <a:pPr lvl="3"/>
             <a:r>
-              <a:rPr lang="de-DE" smtClean="0"/>
+              <a:rPr lang="de-DE"/>
               <a:t>Vierte Ebene</a:t>
             </a:r>
           </a:p>
           <a:p>
             <a:pPr lvl="4"/>
             <a:r>
-              <a:rPr lang="de-DE" smtClean="0"/>
+              <a:rPr lang="de-DE"/>
               <a:t>Fünfte Ebene</a:t>
             </a:r>
-            <a:endParaRPr lang="de-DE"/>
           </a:p>
         </p:txBody>
       </p:sp>
@@ -1536,7 +1524,7 @@
           <a:p>
             <a:pPr lvl="0"/>
             <a:r>
-              <a:rPr lang="de-DE" smtClean="0"/>
+              <a:rPr lang="de-DE"/>
               <a:t>Textmasterformat bearbeiten</a:t>
             </a:r>
           </a:p>
@@ -1564,38 +1552,37 @@
           <a:p>
             <a:pPr lvl="0"/>
             <a:r>
-              <a:rPr lang="de-DE" smtClean="0"/>
+              <a:rPr lang="de-DE"/>
               <a:t>Textmasterformat bearbeiten</a:t>
             </a:r>
           </a:p>
           <a:p>
             <a:pPr lvl="1"/>
             <a:r>
-              <a:rPr lang="de-DE" smtClean="0"/>
+              <a:rPr lang="de-DE"/>
               <a:t>Zweite Ebene</a:t>
             </a:r>
           </a:p>
           <a:p>
             <a:pPr lvl="2"/>
             <a:r>
-              <a:rPr lang="de-DE" smtClean="0"/>
+              <a:rPr lang="de-DE"/>
               <a:t>Dritte Ebene</a:t>
             </a:r>
           </a:p>
           <a:p>
             <a:pPr lvl="3"/>
             <a:r>
-              <a:rPr lang="de-DE" smtClean="0"/>
+              <a:rPr lang="de-DE"/>
               <a:t>Vierte Ebene</a:t>
             </a:r>
           </a:p>
           <a:p>
             <a:pPr lvl="4"/>
             <a:r>
-              <a:rPr lang="de-DE" smtClean="0"/>
+              <a:rPr lang="de-DE"/>
               <a:t>Fünfte Ebene</a:t>
             </a:r>
-            <a:endParaRPr lang="de-DE"/>
           </a:p>
         </p:txBody>
       </p:sp>
@@ -1710,10 +1697,9 @@
           <a:lstStyle/>
           <a:p>
             <a:r>
-              <a:rPr lang="de-DE" smtClean="0"/>
+              <a:rPr lang="de-DE"/>
               <a:t>Titelmasterformat durch Klicken bearbeiten</a:t>
             </a:r>
-            <a:endParaRPr lang="de-DE"/>
           </a:p>
         </p:txBody>
       </p:sp>
@@ -1932,10 +1918,9 @@
           </a:lstStyle>
           <a:p>
             <a:r>
-              <a:rPr lang="de-DE" smtClean="0"/>
+              <a:rPr lang="de-DE"/>
               <a:t>Titelmasterformat durch Klicken bearbeiten</a:t>
             </a:r>
-            <a:endParaRPr lang="de-DE"/>
           </a:p>
         </p:txBody>
       </p:sp>
@@ -1989,38 +1974,37 @@
           <a:p>
             <a:pPr lvl="0"/>
             <a:r>
-              <a:rPr lang="de-DE" smtClean="0"/>
+              <a:rPr lang="de-DE"/>
               <a:t>Textmasterformat bearbeiten</a:t>
             </a:r>
           </a:p>
           <a:p>
             <a:pPr lvl="1"/>
             <a:r>
-              <a:rPr lang="de-DE" smtClean="0"/>
+              <a:rPr lang="de-DE"/>
               <a:t>Zweite Ebene</a:t>
             </a:r>
           </a:p>
           <a:p>
             <a:pPr lvl="2"/>
             <a:r>
-              <a:rPr lang="de-DE" smtClean="0"/>
+              <a:rPr lang="de-DE"/>
               <a:t>Dritte Ebene</a:t>
             </a:r>
           </a:p>
           <a:p>
             <a:pPr lvl="3"/>
             <a:r>
-              <a:rPr lang="de-DE" smtClean="0"/>
+              <a:rPr lang="de-DE"/>
               <a:t>Vierte Ebene</a:t>
             </a:r>
           </a:p>
           <a:p>
             <a:pPr lvl="4"/>
             <a:r>
-              <a:rPr lang="de-DE" smtClean="0"/>
+              <a:rPr lang="de-DE"/>
               <a:t>Fünfte Ebene</a:t>
             </a:r>
-            <a:endParaRPr lang="de-DE"/>
           </a:p>
         </p:txBody>
       </p:sp>
@@ -2083,7 +2067,7 @@
           <a:p>
             <a:pPr lvl="0"/>
             <a:r>
-              <a:rPr lang="de-DE" smtClean="0"/>
+              <a:rPr lang="de-DE"/>
               <a:t>Textmasterformat bearbeiten</a:t>
             </a:r>
           </a:p>
@@ -2209,10 +2193,9 @@
           </a:lstStyle>
           <a:p>
             <a:r>
-              <a:rPr lang="de-DE" smtClean="0"/>
+              <a:rPr lang="de-DE"/>
               <a:t>Titelmasterformat durch Klicken bearbeiten</a:t>
             </a:r>
-            <a:endParaRPr lang="de-DE"/>
           </a:p>
         </p:txBody>
       </p:sp>
@@ -2336,7 +2319,7 @@
           <a:p>
             <a:pPr lvl="0"/>
             <a:r>
-              <a:rPr lang="de-DE" smtClean="0"/>
+              <a:rPr lang="de-DE"/>
               <a:t>Textmasterformat bearbeiten</a:t>
             </a:r>
           </a:p>
@@ -2468,10 +2451,9 @@
           <a:lstStyle/>
           <a:p>
             <a:r>
-              <a:rPr lang="de-DE" smtClean="0"/>
+              <a:rPr lang="de-DE"/>
               <a:t>Titelmasterformat durch Klicken bearbeiten</a:t>
             </a:r>
-            <a:endParaRPr lang="de-DE"/>
           </a:p>
         </p:txBody>
       </p:sp>
@@ -2502,38 +2484,37 @@
           <a:p>
             <a:pPr lvl="0"/>
             <a:r>
-              <a:rPr lang="de-DE" smtClean="0"/>
+              <a:rPr lang="de-DE"/>
               <a:t>Textmasterformat bearbeiten</a:t>
             </a:r>
           </a:p>
           <a:p>
             <a:pPr lvl="1"/>
             <a:r>
-              <a:rPr lang="de-DE" smtClean="0"/>
+              <a:rPr lang="de-DE"/>
               <a:t>Zweite Ebene</a:t>
             </a:r>
           </a:p>
           <a:p>
             <a:pPr lvl="2"/>
             <a:r>
-              <a:rPr lang="de-DE" smtClean="0"/>
+              <a:rPr lang="de-DE"/>
               <a:t>Dritte Ebene</a:t>
             </a:r>
           </a:p>
           <a:p>
             <a:pPr lvl="3"/>
             <a:r>
-              <a:rPr lang="de-DE" smtClean="0"/>
+              <a:rPr lang="de-DE"/>
               <a:t>Vierte Ebene</a:t>
             </a:r>
           </a:p>
           <a:p>
             <a:pPr lvl="4"/>
             <a:r>
-              <a:rPr lang="de-DE" smtClean="0"/>
+              <a:rPr lang="de-DE"/>
               <a:t>Fünfte Ebene</a:t>
             </a:r>
-            <a:endParaRPr lang="de-DE"/>
           </a:p>
         </p:txBody>
       </p:sp>
@@ -2993,7 +2974,7 @@
           <a:lstStyle/>
           <a:p>
             <a:r>
-              <a:rPr lang="de-DE" dirty="0" err="1" smtClean="0"/>
+              <a:rPr lang="de-DE" dirty="0" err="1"/>
               <a:t>Skymensions</a:t>
             </a:r>
             <a:endParaRPr lang="de-DE" dirty="0"/>
@@ -3016,37 +2997,36 @@
           <a:lstStyle/>
           <a:p>
             <a:r>
-              <a:rPr lang="de-DE" dirty="0" smtClean="0"/>
+              <a:rPr lang="de-DE" dirty="0"/>
               <a:t>Creative </a:t>
             </a:r>
             <a:r>
-              <a:rPr lang="de-DE" dirty="0" err="1" smtClean="0"/>
+              <a:rPr lang="de-DE" dirty="0" err="1"/>
               <a:t>Nonsense</a:t>
             </a:r>
             <a:r>
-              <a:rPr lang="de-DE" dirty="0" smtClean="0"/>
+              <a:rPr lang="de-DE" dirty="0"/>
               <a:t> </a:t>
             </a:r>
             <a:r>
-              <a:rPr lang="de-DE" dirty="0" err="1" smtClean="0"/>
+              <a:rPr lang="de-DE" dirty="0" err="1"/>
               <a:t>by</a:t>
             </a:r>
-            <a:endParaRPr lang="de-DE" dirty="0" smtClean="0"/>
-          </a:p>
-          <a:p>
-            <a:r>
-              <a:rPr lang="de-DE" dirty="0" smtClean="0"/>
+            <a:endParaRPr lang="de-DE" dirty="0"/>
+          </a:p>
+          <a:p>
+            <a:r>
+              <a:rPr lang="de-DE" dirty="0"/>
               <a:t>Daniel Janzen, Robert </a:t>
             </a:r>
             <a:r>
-              <a:rPr lang="de-DE" dirty="0" err="1" smtClean="0"/>
+              <a:rPr lang="de-DE" dirty="0" err="1"/>
               <a:t>Jonetzko</a:t>
             </a:r>
             <a:r>
-              <a:rPr lang="de-DE" dirty="0" smtClean="0"/>
+              <a:rPr lang="de-DE" dirty="0"/>
               <a:t>, Niels Quanz</a:t>
             </a:r>
-            <a:endParaRPr lang="de-DE" dirty="0"/>
           </a:p>
         </p:txBody>
       </p:sp>
@@ -3060,17 +3040,10 @@
   <p:clrMapOvr>
     <a:masterClrMapping/>
   </p:clrMapOvr>
-  <p:timing>
-    <p:tnLst>
-      <p:par>
-        <p:cTn id="1" dur="indefinite" restart="never" nodeType="tmRoot"/>
-      </p:par>
-    </p:tnLst>
-  </p:timing>
 </p:sld>
 </file>
 
-<file path=ppt/slides/slide2.xml><?xml version="1.0" encoding="utf-8"?>
+<file path=ppt/slides/slide10.xml><?xml version="1.0" encoding="utf-8"?>
 <p:sld xmlns:a="http://schemas.openxmlformats.org/drawingml/2006/main" xmlns:r="http://schemas.openxmlformats.org/officeDocument/2006/relationships" xmlns:p="http://schemas.openxmlformats.org/presentationml/2006/main">
   <p:cSld>
     <p:spTree>
@@ -3103,87 +3076,74 @@
           <a:lstStyle/>
           <a:p>
             <a:r>
-              <a:rPr lang="de-DE" dirty="0" smtClean="0"/>
-              <a:t>Kurzbeschreibung</a:t>
-            </a:r>
+              <a:rPr lang="de-DE" dirty="0"/>
+              <a:t>Verantwortungsbereich Daniel</a:t>
+            </a:r>
+          </a:p>
+        </p:txBody>
+      </p:sp>
+      <p:sp>
+        <p:nvSpPr>
+          <p:cNvPr id="3" name="Inhaltsplatzhalter 2"/>
+          <p:cNvSpPr>
+            <a:spLocks noGrp="1"/>
+          </p:cNvSpPr>
+          <p:nvPr>
+            <p:ph idx="1"/>
+          </p:nvPr>
+        </p:nvSpPr>
+        <p:spPr>
+          <a:xfrm>
+            <a:off x="838200" y="1825625"/>
+            <a:ext cx="3707674" cy="4351338"/>
+          </a:xfrm>
+        </p:spPr>
+        <p:txBody>
+          <a:bodyPr/>
+          <a:lstStyle/>
+          <a:p>
+            <a:r>
+              <a:rPr lang="de-DE" dirty="0"/>
+              <a:t>Menu</a:t>
+            </a:r>
+          </a:p>
+          <a:p>
+            <a:r>
+              <a:rPr lang="de-DE" dirty="0"/>
+              <a:t>Item Drop</a:t>
+            </a:r>
+          </a:p>
+          <a:p>
+            <a:r>
+              <a:rPr lang="de-DE" dirty="0"/>
+              <a:t>Item Design</a:t>
+            </a:r>
+          </a:p>
+          <a:p>
             <a:endParaRPr lang="de-DE" dirty="0"/>
           </a:p>
-        </p:txBody>
-      </p:sp>
-      <p:sp>
-        <p:nvSpPr>
-          <p:cNvPr id="3" name="Inhaltsplatzhalter 2"/>
-          <p:cNvSpPr>
-            <a:spLocks noGrp="1"/>
-          </p:cNvSpPr>
-          <p:nvPr>
-            <p:ph idx="1"/>
-          </p:nvPr>
-        </p:nvSpPr>
-        <p:spPr/>
-        <p:txBody>
-          <a:bodyPr/>
-          <a:lstStyle/>
-          <a:p>
-            <a:pPr marL="0" indent="0">
-              <a:buNone/>
-            </a:pPr>
-            <a:r>
-              <a:rPr lang="de-DE" dirty="0" err="1"/>
-              <a:t>Skymensions</a:t>
-            </a:r>
-            <a:r>
-              <a:rPr lang="de-DE" dirty="0"/>
-              <a:t> wird ein Low </a:t>
-            </a:r>
-            <a:r>
-              <a:rPr lang="de-DE" dirty="0" err="1"/>
-              <a:t>Poly</a:t>
-            </a:r>
-            <a:r>
-              <a:rPr lang="de-DE" dirty="0"/>
-              <a:t> </a:t>
-            </a:r>
-            <a:r>
-              <a:rPr lang="de-DE" dirty="0" err="1"/>
-              <a:t>Roguelike</a:t>
-            </a:r>
-            <a:r>
-              <a:rPr lang="de-DE" dirty="0"/>
-              <a:t> Adventure. Jedes Spiel ist einzigartig, dank prozeduraler Generierung der einzelnen Level. Der Spieler muss Gegner besiegen, Fallen erkennen und Hindernisse überwinden. Jedes Level endet mit einem Portal, welches den Spieler in das nächste Level teleportiert. Items, Bosse und Überraschungen erwarten den Spieler in </a:t>
-            </a:r>
-            <a:r>
-              <a:rPr lang="de-DE" dirty="0" err="1"/>
-              <a:t>Skymensions</a:t>
-            </a:r>
-            <a:r>
-              <a:rPr lang="de-DE" dirty="0"/>
-              <a:t>.</a:t>
-            </a:r>
+          <a:p>
+            <a:endParaRPr lang="de-DE" dirty="0"/>
+          </a:p>
+          <a:p>
+            <a:endParaRPr lang="de-DE" dirty="0"/>
           </a:p>
         </p:txBody>
       </p:sp>
     </p:spTree>
     <p:extLst>
       <p:ext uri="{BB962C8B-B14F-4D97-AF65-F5344CB8AC3E}">
-        <p14:creationId xmlns:p14="http://schemas.microsoft.com/office/powerpoint/2010/main" val="3177102457"/>
+        <p14:creationId xmlns:p14="http://schemas.microsoft.com/office/powerpoint/2010/main" val="1724282653"/>
       </p:ext>
     </p:extLst>
   </p:cSld>
   <p:clrMapOvr>
     <a:masterClrMapping/>
   </p:clrMapOvr>
-  <p:timing>
-    <p:tnLst>
-      <p:par>
-        <p:cTn id="1" dur="indefinite" restart="never" nodeType="tmRoot"/>
-      </p:par>
-    </p:tnLst>
-  </p:timing>
 </p:sld>
 </file>
 
-<file path=ppt/slides/slide3.xml><?xml version="1.0" encoding="utf-8"?>
+<file path=ppt/slides/slide11.xml><?xml version="1.0" encoding="utf-8"?>
 <p:sld xmlns:a="http://schemas.openxmlformats.org/drawingml/2006/main" xmlns:r="http://schemas.openxmlformats.org/officeDocument/2006/relationships" xmlns:p="http://schemas.openxmlformats.org/presentationml/2006/main">
   <p:cSld>
     <p:spTree>
@@ -3216,648 +3176,54 @@
           <a:lstStyle/>
           <a:p>
             <a:r>
-              <a:rPr lang="de-DE" dirty="0" smtClean="0"/>
-              <a:t>Storyboard</a:t>
+              <a:rPr lang="de-DE" dirty="0"/>
+              <a:t>Meilensteine</a:t>
+            </a:r>
+          </a:p>
+        </p:txBody>
+      </p:sp>
+      <p:sp>
+        <p:nvSpPr>
+          <p:cNvPr id="3" name="Inhaltsplatzhalter 2"/>
+          <p:cNvSpPr>
+            <a:spLocks noGrp="1"/>
+          </p:cNvSpPr>
+          <p:nvPr>
+            <p:ph idx="1"/>
+          </p:nvPr>
+        </p:nvSpPr>
+        <p:spPr/>
+        <p:txBody>
+          <a:bodyPr/>
+          <a:lstStyle/>
+          <a:p>
+            <a:r>
+              <a:rPr lang="de-DE" dirty="0"/>
+              <a:t>Welt Generierung</a:t>
+            </a:r>
+          </a:p>
+          <a:p>
+            <a:r>
+              <a:rPr lang="de-DE" dirty="0"/>
+              <a:t>KI/</a:t>
+            </a:r>
+            <a:r>
+              <a:rPr lang="de-DE" dirty="0" err="1"/>
+              <a:t>Collision</a:t>
             </a:r>
             <a:endParaRPr lang="de-DE" dirty="0"/>
           </a:p>
-        </p:txBody>
-      </p:sp>
-      <p:pic>
-        <p:nvPicPr>
-          <p:cNvPr id="4" name="Grafik 3"/>
-          <p:cNvPicPr>
-            <a:picLocks noChangeAspect="1"/>
-          </p:cNvPicPr>
-          <p:nvPr/>
-        </p:nvPicPr>
-        <p:blipFill rotWithShape="1">
-          <a:blip r:embed="rId2" cstate="print">
-            <a:extLst>
-              <a:ext uri="{28A0092B-C50C-407E-A947-70E740481C1C}">
-                <a14:useLocalDpi xmlns:a14="http://schemas.microsoft.com/office/drawing/2010/main" val="0"/>
-              </a:ext>
-            </a:extLst>
-          </a:blip>
-          <a:srcRect t="33884" b="27823"/>
-          <a:stretch/>
-        </p:blipFill>
-        <p:spPr>
-          <a:xfrm>
-            <a:off x="894522" y="2425148"/>
-            <a:ext cx="9621078" cy="2072310"/>
-          </a:xfrm>
-          <a:prstGeom prst="rect">
-            <a:avLst/>
-          </a:prstGeom>
-        </p:spPr>
-      </p:pic>
-    </p:spTree>
-    <p:extLst>
-      <p:ext uri="{BB962C8B-B14F-4D97-AF65-F5344CB8AC3E}">
-        <p14:creationId xmlns:p14="http://schemas.microsoft.com/office/powerpoint/2010/main" val="3614802374"/>
-      </p:ext>
-    </p:extLst>
-  </p:cSld>
-  <p:clrMapOvr>
-    <a:masterClrMapping/>
-  </p:clrMapOvr>
-  <p:timing>
-    <p:tnLst>
-      <p:par>
-        <p:cTn id="1" dur="indefinite" restart="never" nodeType="tmRoot"/>
-      </p:par>
-    </p:tnLst>
-  </p:timing>
-</p:sld>
-</file>
-
-<file path=ppt/slides/slide4.xml><?xml version="1.0" encoding="utf-8"?>
-<p:sld xmlns:a="http://schemas.openxmlformats.org/drawingml/2006/main" xmlns:r="http://schemas.openxmlformats.org/officeDocument/2006/relationships" xmlns:p="http://schemas.openxmlformats.org/presentationml/2006/main">
-  <p:cSld>
-    <p:spTree>
-      <p:nvGrpSpPr>
-        <p:cNvPr id="1" name=""/>
-        <p:cNvGrpSpPr/>
-        <p:nvPr/>
-      </p:nvGrpSpPr>
-      <p:grpSpPr>
-        <a:xfrm>
-          <a:off x="0" y="0"/>
-          <a:ext cx="0" cy="0"/>
-          <a:chOff x="0" y="0"/>
-          <a:chExt cx="0" cy="0"/>
-        </a:xfrm>
-      </p:grpSpPr>
-      <p:sp>
-        <p:nvSpPr>
-          <p:cNvPr id="2" name="Titel 1"/>
-          <p:cNvSpPr>
-            <a:spLocks noGrp="1"/>
-          </p:cNvSpPr>
-          <p:nvPr>
-            <p:ph type="title"/>
-          </p:nvPr>
-        </p:nvSpPr>
-        <p:spPr/>
-        <p:txBody>
-          <a:bodyPr/>
-          <a:lstStyle/>
-          <a:p>
-            <a:r>
-              <a:rPr lang="de-DE" dirty="0" smtClean="0"/>
-              <a:t>Verantwortungsbereich Niels</a:t>
-            </a:r>
+          <a:p>
+            <a:r>
+              <a:rPr lang="de-DE" dirty="0"/>
+              <a:t>Item Drops</a:t>
+            </a:r>
+          </a:p>
+          <a:p>
             <a:endParaRPr lang="de-DE" dirty="0"/>
           </a:p>
-        </p:txBody>
-      </p:sp>
-      <p:sp>
-        <p:nvSpPr>
-          <p:cNvPr id="3" name="Inhaltsplatzhalter 2"/>
-          <p:cNvSpPr>
-            <a:spLocks noGrp="1"/>
-          </p:cNvSpPr>
-          <p:nvPr>
-            <p:ph idx="1"/>
-          </p:nvPr>
-        </p:nvSpPr>
-        <p:spPr>
-          <a:xfrm>
-            <a:off x="838200" y="1825625"/>
-            <a:ext cx="3864429" cy="4351338"/>
-          </a:xfrm>
-        </p:spPr>
-        <p:txBody>
-          <a:bodyPr/>
-          <a:lstStyle/>
-          <a:p>
-            <a:r>
-              <a:rPr lang="de-DE" dirty="0" smtClean="0"/>
-              <a:t>KI</a:t>
-            </a:r>
-          </a:p>
-          <a:p>
-            <a:r>
-              <a:rPr lang="de-DE" dirty="0" err="1" smtClean="0"/>
-              <a:t>Movenment</a:t>
-            </a:r>
-            <a:r>
-              <a:rPr lang="de-DE" dirty="0" smtClean="0"/>
-              <a:t>/Kamera</a:t>
-            </a:r>
-          </a:p>
-          <a:p>
-            <a:endParaRPr lang="de-DE" dirty="0" smtClean="0"/>
-          </a:p>
-        </p:txBody>
-      </p:sp>
-    </p:spTree>
-    <p:extLst>
-      <p:ext uri="{BB962C8B-B14F-4D97-AF65-F5344CB8AC3E}">
-        <p14:creationId xmlns:p14="http://schemas.microsoft.com/office/powerpoint/2010/main" val="2637673204"/>
-      </p:ext>
-    </p:extLst>
-  </p:cSld>
-  <p:clrMapOvr>
-    <a:masterClrMapping/>
-  </p:clrMapOvr>
-  <p:timing>
-    <p:tnLst>
-      <p:par>
-        <p:cTn id="1" dur="indefinite" restart="never" nodeType="tmRoot"/>
-      </p:par>
-    </p:tnLst>
-  </p:timing>
-</p:sld>
-</file>
-
-<file path=ppt/slides/slide5.xml><?xml version="1.0" encoding="utf-8"?>
-<p:sld xmlns:a="http://schemas.openxmlformats.org/drawingml/2006/main" xmlns:r="http://schemas.openxmlformats.org/officeDocument/2006/relationships" xmlns:p="http://schemas.openxmlformats.org/presentationml/2006/main">
-  <p:cSld>
-    <p:spTree>
-      <p:nvGrpSpPr>
-        <p:cNvPr id="1" name=""/>
-        <p:cNvGrpSpPr/>
-        <p:nvPr/>
-      </p:nvGrpSpPr>
-      <p:grpSpPr>
-        <a:xfrm>
-          <a:off x="0" y="0"/>
-          <a:ext cx="0" cy="0"/>
-          <a:chOff x="0" y="0"/>
-          <a:chExt cx="0" cy="0"/>
-        </a:xfrm>
-      </p:grpSpPr>
-      <p:sp>
-        <p:nvSpPr>
-          <p:cNvPr id="2" name="Titel 1"/>
-          <p:cNvSpPr>
-            <a:spLocks noGrp="1"/>
-          </p:cNvSpPr>
-          <p:nvPr>
-            <p:ph type="title"/>
-          </p:nvPr>
-        </p:nvSpPr>
-        <p:spPr/>
-        <p:txBody>
-          <a:bodyPr/>
-          <a:lstStyle/>
-          <a:p>
-            <a:r>
-              <a:rPr lang="de-DE" dirty="0" smtClean="0"/>
-              <a:t>KI</a:t>
-            </a:r>
+          <a:p>
             <a:endParaRPr lang="de-DE" dirty="0"/>
-          </a:p>
-        </p:txBody>
-      </p:sp>
-      <p:pic>
-        <p:nvPicPr>
-          <p:cNvPr id="3" name="Grafik 2"/>
-          <p:cNvPicPr>
-            <a:picLocks noChangeAspect="1"/>
-          </p:cNvPicPr>
-          <p:nvPr/>
-        </p:nvPicPr>
-        <p:blipFill>
-          <a:blip r:embed="rId2"/>
-          <a:stretch>
-            <a:fillRect/>
-          </a:stretch>
-        </p:blipFill>
-        <p:spPr>
-          <a:xfrm>
-            <a:off x="1827716" y="0"/>
-            <a:ext cx="8205642" cy="6858000"/>
-          </a:xfrm>
-          <a:prstGeom prst="rect">
-            <a:avLst/>
-          </a:prstGeom>
-        </p:spPr>
-      </p:pic>
-    </p:spTree>
-    <p:extLst>
-      <p:ext uri="{BB962C8B-B14F-4D97-AF65-F5344CB8AC3E}">
-        <p14:creationId xmlns:p14="http://schemas.microsoft.com/office/powerpoint/2010/main" val="1536122512"/>
-      </p:ext>
-    </p:extLst>
-  </p:cSld>
-  <p:clrMapOvr>
-    <a:masterClrMapping/>
-  </p:clrMapOvr>
-  <p:timing>
-    <p:tnLst>
-      <p:par>
-        <p:cTn id="1" dur="indefinite" restart="never" nodeType="tmRoot"/>
-      </p:par>
-    </p:tnLst>
-  </p:timing>
-</p:sld>
-</file>
-
-<file path=ppt/slides/slide6.xml><?xml version="1.0" encoding="utf-8"?>
-<p:sld xmlns:a="http://schemas.openxmlformats.org/drawingml/2006/main" xmlns:r="http://schemas.openxmlformats.org/officeDocument/2006/relationships" xmlns:p="http://schemas.openxmlformats.org/presentationml/2006/main">
-  <p:cSld>
-    <p:spTree>
-      <p:nvGrpSpPr>
-        <p:cNvPr id="1" name=""/>
-        <p:cNvGrpSpPr/>
-        <p:nvPr/>
-      </p:nvGrpSpPr>
-      <p:grpSpPr>
-        <a:xfrm>
-          <a:off x="0" y="0"/>
-          <a:ext cx="0" cy="0"/>
-          <a:chOff x="0" y="0"/>
-          <a:chExt cx="0" cy="0"/>
-        </a:xfrm>
-      </p:grpSpPr>
-      <p:sp>
-        <p:nvSpPr>
-          <p:cNvPr id="2" name="Titel 1"/>
-          <p:cNvSpPr>
-            <a:spLocks noGrp="1"/>
-          </p:cNvSpPr>
-          <p:nvPr>
-            <p:ph type="title"/>
-          </p:nvPr>
-        </p:nvSpPr>
-        <p:spPr/>
-        <p:txBody>
-          <a:bodyPr/>
-          <a:lstStyle/>
-          <a:p>
-            <a:r>
-              <a:rPr lang="de-DE" dirty="0" smtClean="0"/>
-              <a:t>Movement </a:t>
-            </a:r>
-            <a:endParaRPr lang="de-DE" dirty="0"/>
-          </a:p>
-        </p:txBody>
-      </p:sp>
-      <p:pic>
-        <p:nvPicPr>
-          <p:cNvPr id="4" name="Grafik 3"/>
-          <p:cNvPicPr>
-            <a:picLocks noChangeAspect="1"/>
-          </p:cNvPicPr>
-          <p:nvPr/>
-        </p:nvPicPr>
-        <p:blipFill>
-          <a:blip r:embed="rId2">
-            <a:extLst>
-              <a:ext uri="{28A0092B-C50C-407E-A947-70E740481C1C}">
-                <a14:useLocalDpi xmlns:a14="http://schemas.microsoft.com/office/drawing/2010/main" val="0"/>
-              </a:ext>
-            </a:extLst>
-          </a:blip>
-          <a:stretch>
-            <a:fillRect/>
-          </a:stretch>
-        </p:blipFill>
-        <p:spPr>
-          <a:xfrm>
-            <a:off x="4035357" y="0"/>
-            <a:ext cx="6002334" cy="6858000"/>
-          </a:xfrm>
-          <a:prstGeom prst="rect">
-            <a:avLst/>
-          </a:prstGeom>
-        </p:spPr>
-      </p:pic>
-    </p:spTree>
-    <p:extLst>
-      <p:ext uri="{BB962C8B-B14F-4D97-AF65-F5344CB8AC3E}">
-        <p14:creationId xmlns:p14="http://schemas.microsoft.com/office/powerpoint/2010/main" val="4194890001"/>
-      </p:ext>
-    </p:extLst>
-  </p:cSld>
-  <p:clrMapOvr>
-    <a:masterClrMapping/>
-  </p:clrMapOvr>
-  <p:timing>
-    <p:tnLst>
-      <p:par>
-        <p:cTn id="1" dur="indefinite" restart="never" nodeType="tmRoot"/>
-      </p:par>
-    </p:tnLst>
-  </p:timing>
-</p:sld>
-</file>
-
-<file path=ppt/slides/slide7.xml><?xml version="1.0" encoding="utf-8"?>
-<p:sld xmlns:a="http://schemas.openxmlformats.org/drawingml/2006/main" xmlns:r="http://schemas.openxmlformats.org/officeDocument/2006/relationships" xmlns:p="http://schemas.openxmlformats.org/presentationml/2006/main">
-  <p:cSld>
-    <p:spTree>
-      <p:nvGrpSpPr>
-        <p:cNvPr id="1" name=""/>
-        <p:cNvGrpSpPr/>
-        <p:nvPr/>
-      </p:nvGrpSpPr>
-      <p:grpSpPr>
-        <a:xfrm>
-          <a:off x="0" y="0"/>
-          <a:ext cx="0" cy="0"/>
-          <a:chOff x="0" y="0"/>
-          <a:chExt cx="0" cy="0"/>
-        </a:xfrm>
-      </p:grpSpPr>
-      <p:sp>
-        <p:nvSpPr>
-          <p:cNvPr id="2" name="Titel 1"/>
-          <p:cNvSpPr>
-            <a:spLocks noGrp="1"/>
-          </p:cNvSpPr>
-          <p:nvPr>
-            <p:ph type="title"/>
-          </p:nvPr>
-        </p:nvSpPr>
-        <p:spPr/>
-        <p:txBody>
-          <a:bodyPr/>
-          <a:lstStyle/>
-          <a:p>
-            <a:r>
-              <a:rPr lang="de-DE" dirty="0" smtClean="0"/>
-              <a:t>Verantwortungsbereich Robert</a:t>
-            </a:r>
-            <a:endParaRPr lang="de-DE" dirty="0"/>
-          </a:p>
-        </p:txBody>
-      </p:sp>
-      <p:sp>
-        <p:nvSpPr>
-          <p:cNvPr id="3" name="Inhaltsplatzhalter 2"/>
-          <p:cNvSpPr>
-            <a:spLocks noGrp="1"/>
-          </p:cNvSpPr>
-          <p:nvPr>
-            <p:ph idx="1"/>
-          </p:nvPr>
-        </p:nvSpPr>
-        <p:spPr/>
-        <p:txBody>
-          <a:bodyPr/>
-          <a:lstStyle/>
-          <a:p>
-            <a:r>
-              <a:rPr lang="de-DE" dirty="0" smtClean="0"/>
-              <a:t>Level </a:t>
-            </a:r>
-            <a:r>
-              <a:rPr lang="de-DE" dirty="0" err="1" smtClean="0"/>
-              <a:t>generierung</a:t>
-            </a:r>
-            <a:endParaRPr lang="de-DE" dirty="0" smtClean="0"/>
-          </a:p>
-          <a:p>
-            <a:r>
-              <a:rPr lang="de-DE" dirty="0" smtClean="0"/>
-              <a:t>Attribute Spieler/Gegner</a:t>
-            </a:r>
-          </a:p>
-          <a:p>
-            <a:r>
-              <a:rPr lang="de-DE" dirty="0" smtClean="0"/>
-              <a:t>UI</a:t>
-            </a:r>
-          </a:p>
-          <a:p>
-            <a:r>
-              <a:rPr lang="de-DE" dirty="0" smtClean="0"/>
-              <a:t>Spieler / Gegner </a:t>
-            </a:r>
-            <a:r>
-              <a:rPr lang="de-DE" dirty="0" err="1" smtClean="0"/>
-              <a:t>interaktion</a:t>
-            </a:r>
-            <a:endParaRPr lang="de-DE" dirty="0" smtClean="0"/>
-          </a:p>
-          <a:p>
-            <a:pPr marL="0" indent="0">
-              <a:buNone/>
-            </a:pPr>
-            <a:endParaRPr lang="de-DE" dirty="0" smtClean="0"/>
-          </a:p>
-          <a:p>
-            <a:pPr marL="0" indent="0">
-              <a:buNone/>
-            </a:pPr>
-            <a:endParaRPr lang="de-DE" dirty="0" smtClean="0"/>
-          </a:p>
-        </p:txBody>
-      </p:sp>
-    </p:spTree>
-    <p:extLst>
-      <p:ext uri="{BB962C8B-B14F-4D97-AF65-F5344CB8AC3E}">
-        <p14:creationId xmlns:p14="http://schemas.microsoft.com/office/powerpoint/2010/main" val="4266374917"/>
-      </p:ext>
-    </p:extLst>
-  </p:cSld>
-  <p:clrMapOvr>
-    <a:masterClrMapping/>
-  </p:clrMapOvr>
-  <p:timing>
-    <p:tnLst>
-      <p:par>
-        <p:cTn id="1" dur="indefinite" restart="never" nodeType="tmRoot"/>
-      </p:par>
-    </p:tnLst>
-  </p:timing>
-</p:sld>
-</file>
-
-<file path=ppt/slides/slide8.xml><?xml version="1.0" encoding="utf-8"?>
-<p:sld xmlns:a="http://schemas.openxmlformats.org/drawingml/2006/main" xmlns:r="http://schemas.openxmlformats.org/officeDocument/2006/relationships" xmlns:p="http://schemas.openxmlformats.org/presentationml/2006/main">
-  <p:cSld>
-    <p:spTree>
-      <p:nvGrpSpPr>
-        <p:cNvPr id="1" name=""/>
-        <p:cNvGrpSpPr/>
-        <p:nvPr/>
-      </p:nvGrpSpPr>
-      <p:grpSpPr>
-        <a:xfrm>
-          <a:off x="0" y="0"/>
-          <a:ext cx="0" cy="0"/>
-          <a:chOff x="0" y="0"/>
-          <a:chExt cx="0" cy="0"/>
-        </a:xfrm>
-      </p:grpSpPr>
-      <p:sp>
-        <p:nvSpPr>
-          <p:cNvPr id="2" name="Titel 1"/>
-          <p:cNvSpPr>
-            <a:spLocks noGrp="1"/>
-          </p:cNvSpPr>
-          <p:nvPr>
-            <p:ph type="title"/>
-          </p:nvPr>
-        </p:nvSpPr>
-        <p:spPr/>
-        <p:txBody>
-          <a:bodyPr/>
-          <a:lstStyle/>
-          <a:p>
-            <a:r>
-              <a:rPr lang="de-DE" dirty="0" smtClean="0"/>
-              <a:t>Verantwortungsbereich Daniel</a:t>
-            </a:r>
-            <a:endParaRPr lang="de-DE" dirty="0"/>
-          </a:p>
-        </p:txBody>
-      </p:sp>
-      <p:sp>
-        <p:nvSpPr>
-          <p:cNvPr id="3" name="Inhaltsplatzhalter 2"/>
-          <p:cNvSpPr>
-            <a:spLocks noGrp="1"/>
-          </p:cNvSpPr>
-          <p:nvPr>
-            <p:ph idx="1"/>
-          </p:nvPr>
-        </p:nvSpPr>
-        <p:spPr>
-          <a:xfrm>
-            <a:off x="838200" y="1825625"/>
-            <a:ext cx="3707674" cy="4351338"/>
-          </a:xfrm>
-        </p:spPr>
-        <p:txBody>
-          <a:bodyPr/>
-          <a:lstStyle/>
-          <a:p>
-            <a:r>
-              <a:rPr lang="de-DE" dirty="0" smtClean="0"/>
-              <a:t>Menu</a:t>
-            </a:r>
-          </a:p>
-          <a:p>
-            <a:r>
-              <a:rPr lang="de-DE" dirty="0" smtClean="0"/>
-              <a:t>Item Drop</a:t>
-            </a:r>
-          </a:p>
-          <a:p>
-            <a:r>
-              <a:rPr lang="de-DE" dirty="0" smtClean="0"/>
-              <a:t>Item Design</a:t>
-            </a:r>
-          </a:p>
-          <a:p>
-            <a:endParaRPr lang="de-DE" dirty="0" smtClean="0"/>
-          </a:p>
-          <a:p>
-            <a:endParaRPr lang="de-DE" dirty="0" smtClean="0"/>
-          </a:p>
-          <a:p>
-            <a:endParaRPr lang="de-DE" dirty="0" smtClean="0"/>
-          </a:p>
-        </p:txBody>
-      </p:sp>
-    </p:spTree>
-    <p:extLst>
-      <p:ext uri="{BB962C8B-B14F-4D97-AF65-F5344CB8AC3E}">
-        <p14:creationId xmlns:p14="http://schemas.microsoft.com/office/powerpoint/2010/main" val="1724282653"/>
-      </p:ext>
-    </p:extLst>
-  </p:cSld>
-  <p:clrMapOvr>
-    <a:masterClrMapping/>
-  </p:clrMapOvr>
-  <p:timing>
-    <p:tnLst>
-      <p:par>
-        <p:cTn id="1" dur="indefinite" restart="never" nodeType="tmRoot"/>
-      </p:par>
-    </p:tnLst>
-  </p:timing>
-</p:sld>
-</file>
-
-<file path=ppt/slides/slide9.xml><?xml version="1.0" encoding="utf-8"?>
-<p:sld xmlns:a="http://schemas.openxmlformats.org/drawingml/2006/main" xmlns:r="http://schemas.openxmlformats.org/officeDocument/2006/relationships" xmlns:p="http://schemas.openxmlformats.org/presentationml/2006/main">
-  <p:cSld>
-    <p:spTree>
-      <p:nvGrpSpPr>
-        <p:cNvPr id="1" name=""/>
-        <p:cNvGrpSpPr/>
-        <p:nvPr/>
-      </p:nvGrpSpPr>
-      <p:grpSpPr>
-        <a:xfrm>
-          <a:off x="0" y="0"/>
-          <a:ext cx="0" cy="0"/>
-          <a:chOff x="0" y="0"/>
-          <a:chExt cx="0" cy="0"/>
-        </a:xfrm>
-      </p:grpSpPr>
-      <p:sp>
-        <p:nvSpPr>
-          <p:cNvPr id="2" name="Titel 1"/>
-          <p:cNvSpPr>
-            <a:spLocks noGrp="1"/>
-          </p:cNvSpPr>
-          <p:nvPr>
-            <p:ph type="title"/>
-          </p:nvPr>
-        </p:nvSpPr>
-        <p:spPr/>
-        <p:txBody>
-          <a:bodyPr/>
-          <a:lstStyle/>
-          <a:p>
-            <a:r>
-              <a:rPr lang="de-DE" dirty="0" smtClean="0"/>
-              <a:t>Meilensteine</a:t>
-            </a:r>
-            <a:endParaRPr lang="de-DE" dirty="0"/>
-          </a:p>
-        </p:txBody>
-      </p:sp>
-      <p:sp>
-        <p:nvSpPr>
-          <p:cNvPr id="3" name="Inhaltsplatzhalter 2"/>
-          <p:cNvSpPr>
-            <a:spLocks noGrp="1"/>
-          </p:cNvSpPr>
-          <p:nvPr>
-            <p:ph idx="1"/>
-          </p:nvPr>
-        </p:nvSpPr>
-        <p:spPr/>
-        <p:txBody>
-          <a:bodyPr/>
-          <a:lstStyle/>
-          <a:p>
-            <a:r>
-              <a:rPr lang="de-DE" dirty="0" smtClean="0"/>
-              <a:t>Welt Generierung</a:t>
-            </a:r>
-          </a:p>
-          <a:p>
-            <a:r>
-              <a:rPr lang="de-DE" dirty="0" smtClean="0"/>
-              <a:t>KI/</a:t>
-            </a:r>
-            <a:r>
-              <a:rPr lang="de-DE" dirty="0" err="1" smtClean="0"/>
-              <a:t>Collision</a:t>
-            </a:r>
-            <a:endParaRPr lang="de-DE" dirty="0" smtClean="0"/>
-          </a:p>
-          <a:p>
-            <a:r>
-              <a:rPr lang="de-DE" dirty="0" smtClean="0"/>
-              <a:t>Item Drops</a:t>
-            </a:r>
-          </a:p>
-          <a:p>
-            <a:endParaRPr lang="de-DE" dirty="0" smtClean="0"/>
-          </a:p>
-          <a:p>
-            <a:endParaRPr lang="de-DE" dirty="0" smtClean="0"/>
           </a:p>
           <a:p>
             <a:endParaRPr lang="de-DE" dirty="0"/>
@@ -3990,6 +3356,759 @@
       </p:par>
     </p:tnLst>
   </p:timing>
+</p:sld>
+</file>
+
+<file path=ppt/slides/slide2.xml><?xml version="1.0" encoding="utf-8"?>
+<p:sld xmlns:a="http://schemas.openxmlformats.org/drawingml/2006/main" xmlns:r="http://schemas.openxmlformats.org/officeDocument/2006/relationships" xmlns:p="http://schemas.openxmlformats.org/presentationml/2006/main">
+  <p:cSld>
+    <p:spTree>
+      <p:nvGrpSpPr>
+        <p:cNvPr id="1" name=""/>
+        <p:cNvGrpSpPr/>
+        <p:nvPr/>
+      </p:nvGrpSpPr>
+      <p:grpSpPr>
+        <a:xfrm>
+          <a:off x="0" y="0"/>
+          <a:ext cx="0" cy="0"/>
+          <a:chOff x="0" y="0"/>
+          <a:chExt cx="0" cy="0"/>
+        </a:xfrm>
+      </p:grpSpPr>
+      <p:sp>
+        <p:nvSpPr>
+          <p:cNvPr id="2" name="Titel 1"/>
+          <p:cNvSpPr>
+            <a:spLocks noGrp="1"/>
+          </p:cNvSpPr>
+          <p:nvPr>
+            <p:ph type="title"/>
+          </p:nvPr>
+        </p:nvSpPr>
+        <p:spPr/>
+        <p:txBody>
+          <a:bodyPr/>
+          <a:lstStyle/>
+          <a:p>
+            <a:r>
+              <a:rPr lang="de-DE" dirty="0"/>
+              <a:t>Kurzbeschreibung</a:t>
+            </a:r>
+          </a:p>
+        </p:txBody>
+      </p:sp>
+      <p:sp>
+        <p:nvSpPr>
+          <p:cNvPr id="3" name="Inhaltsplatzhalter 2"/>
+          <p:cNvSpPr>
+            <a:spLocks noGrp="1"/>
+          </p:cNvSpPr>
+          <p:nvPr>
+            <p:ph idx="1"/>
+          </p:nvPr>
+        </p:nvSpPr>
+        <p:spPr/>
+        <p:txBody>
+          <a:bodyPr/>
+          <a:lstStyle/>
+          <a:p>
+            <a:pPr marL="0" indent="0">
+              <a:buNone/>
+            </a:pPr>
+            <a:r>
+              <a:rPr lang="de-DE" dirty="0" err="1"/>
+              <a:t>Skymensions</a:t>
+            </a:r>
+            <a:r>
+              <a:rPr lang="de-DE" dirty="0"/>
+              <a:t> wird ein Low </a:t>
+            </a:r>
+            <a:r>
+              <a:rPr lang="de-DE" dirty="0" err="1"/>
+              <a:t>Poly</a:t>
+            </a:r>
+            <a:r>
+              <a:rPr lang="de-DE" dirty="0"/>
+              <a:t> </a:t>
+            </a:r>
+            <a:r>
+              <a:rPr lang="de-DE" dirty="0" err="1"/>
+              <a:t>Roguelike</a:t>
+            </a:r>
+            <a:r>
+              <a:rPr lang="de-DE" dirty="0"/>
+              <a:t> Adventure. Jedes Spiel ist einzigartig, dank prozeduraler Generierung der einzelnen Level. Der Spieler muss Gegner besiegen, Fallen erkennen und Hindernisse überwinden. Jedes Level endet mit einem Portal, welches den Spieler in das nächste Level teleportiert. Items, Bosse und Überraschungen erwarten den Spieler in </a:t>
+            </a:r>
+            <a:r>
+              <a:rPr lang="de-DE" dirty="0" err="1"/>
+              <a:t>Skymensions</a:t>
+            </a:r>
+            <a:r>
+              <a:rPr lang="de-DE" dirty="0"/>
+              <a:t>.</a:t>
+            </a:r>
+          </a:p>
+        </p:txBody>
+      </p:sp>
+    </p:spTree>
+    <p:extLst>
+      <p:ext uri="{BB962C8B-B14F-4D97-AF65-F5344CB8AC3E}">
+        <p14:creationId xmlns:p14="http://schemas.microsoft.com/office/powerpoint/2010/main" val="3177102457"/>
+      </p:ext>
+    </p:extLst>
+  </p:cSld>
+  <p:clrMapOvr>
+    <a:masterClrMapping/>
+  </p:clrMapOvr>
+</p:sld>
+</file>
+
+<file path=ppt/slides/slide3.xml><?xml version="1.0" encoding="utf-8"?>
+<p:sld xmlns:a="http://schemas.openxmlformats.org/drawingml/2006/main" xmlns:r="http://schemas.openxmlformats.org/officeDocument/2006/relationships" xmlns:p="http://schemas.openxmlformats.org/presentationml/2006/main">
+  <p:cSld>
+    <p:spTree>
+      <p:nvGrpSpPr>
+        <p:cNvPr id="1" name=""/>
+        <p:cNvGrpSpPr/>
+        <p:nvPr/>
+      </p:nvGrpSpPr>
+      <p:grpSpPr>
+        <a:xfrm>
+          <a:off x="0" y="0"/>
+          <a:ext cx="0" cy="0"/>
+          <a:chOff x="0" y="0"/>
+          <a:chExt cx="0" cy="0"/>
+        </a:xfrm>
+      </p:grpSpPr>
+      <p:sp>
+        <p:nvSpPr>
+          <p:cNvPr id="2" name="Titel 1"/>
+          <p:cNvSpPr>
+            <a:spLocks noGrp="1"/>
+          </p:cNvSpPr>
+          <p:nvPr>
+            <p:ph type="title"/>
+          </p:nvPr>
+        </p:nvSpPr>
+        <p:spPr/>
+        <p:txBody>
+          <a:bodyPr/>
+          <a:lstStyle/>
+          <a:p>
+            <a:r>
+              <a:rPr lang="de-DE" dirty="0"/>
+              <a:t>Storyboard</a:t>
+            </a:r>
+          </a:p>
+        </p:txBody>
+      </p:sp>
+      <p:pic>
+        <p:nvPicPr>
+          <p:cNvPr id="4" name="Grafik 3"/>
+          <p:cNvPicPr>
+            <a:picLocks noChangeAspect="1"/>
+          </p:cNvPicPr>
+          <p:nvPr/>
+        </p:nvPicPr>
+        <p:blipFill rotWithShape="1">
+          <a:blip r:embed="rId2" cstate="print">
+            <a:extLst>
+              <a:ext uri="{28A0092B-C50C-407E-A947-70E740481C1C}">
+                <a14:useLocalDpi xmlns:a14="http://schemas.microsoft.com/office/drawing/2010/main" val="0"/>
+              </a:ext>
+            </a:extLst>
+          </a:blip>
+          <a:srcRect t="33884" b="27823"/>
+          <a:stretch/>
+        </p:blipFill>
+        <p:spPr>
+          <a:xfrm>
+            <a:off x="894522" y="2425148"/>
+            <a:ext cx="9621078" cy="2072310"/>
+          </a:xfrm>
+          <a:prstGeom prst="rect">
+            <a:avLst/>
+          </a:prstGeom>
+        </p:spPr>
+      </p:pic>
+    </p:spTree>
+    <p:extLst>
+      <p:ext uri="{BB962C8B-B14F-4D97-AF65-F5344CB8AC3E}">
+        <p14:creationId xmlns:p14="http://schemas.microsoft.com/office/powerpoint/2010/main" val="3614802374"/>
+      </p:ext>
+    </p:extLst>
+  </p:cSld>
+  <p:clrMapOvr>
+    <a:masterClrMapping/>
+  </p:clrMapOvr>
+</p:sld>
+</file>
+
+<file path=ppt/slides/slide4.xml><?xml version="1.0" encoding="utf-8"?>
+<p:sld xmlns:a="http://schemas.openxmlformats.org/drawingml/2006/main" xmlns:r="http://schemas.openxmlformats.org/officeDocument/2006/relationships" xmlns:p="http://schemas.openxmlformats.org/presentationml/2006/main">
+  <p:cSld>
+    <p:spTree>
+      <p:nvGrpSpPr>
+        <p:cNvPr id="1" name=""/>
+        <p:cNvGrpSpPr/>
+        <p:nvPr/>
+      </p:nvGrpSpPr>
+      <p:grpSpPr>
+        <a:xfrm>
+          <a:off x="0" y="0"/>
+          <a:ext cx="0" cy="0"/>
+          <a:chOff x="0" y="0"/>
+          <a:chExt cx="0" cy="0"/>
+        </a:xfrm>
+      </p:grpSpPr>
+      <p:sp>
+        <p:nvSpPr>
+          <p:cNvPr id="2" name="Titel 1"/>
+          <p:cNvSpPr>
+            <a:spLocks noGrp="1"/>
+          </p:cNvSpPr>
+          <p:nvPr>
+            <p:ph type="title"/>
+          </p:nvPr>
+        </p:nvSpPr>
+        <p:spPr/>
+        <p:txBody>
+          <a:bodyPr/>
+          <a:lstStyle/>
+          <a:p>
+            <a:r>
+              <a:rPr lang="de-DE" dirty="0"/>
+              <a:t>Verantwortungsbereich Niels</a:t>
+            </a:r>
+          </a:p>
+        </p:txBody>
+      </p:sp>
+      <p:sp>
+        <p:nvSpPr>
+          <p:cNvPr id="3" name="Inhaltsplatzhalter 2"/>
+          <p:cNvSpPr>
+            <a:spLocks noGrp="1"/>
+          </p:cNvSpPr>
+          <p:nvPr>
+            <p:ph idx="1"/>
+          </p:nvPr>
+        </p:nvSpPr>
+        <p:spPr>
+          <a:xfrm>
+            <a:off x="838200" y="1825625"/>
+            <a:ext cx="3864429" cy="4351338"/>
+          </a:xfrm>
+        </p:spPr>
+        <p:txBody>
+          <a:bodyPr/>
+          <a:lstStyle/>
+          <a:p>
+            <a:r>
+              <a:rPr lang="de-DE" dirty="0"/>
+              <a:t>KI</a:t>
+            </a:r>
+          </a:p>
+          <a:p>
+            <a:r>
+              <a:rPr lang="de-DE" dirty="0" err="1"/>
+              <a:t>Movenment</a:t>
+            </a:r>
+            <a:r>
+              <a:rPr lang="de-DE" dirty="0"/>
+              <a:t>/Kamera</a:t>
+            </a:r>
+          </a:p>
+          <a:p>
+            <a:endParaRPr lang="de-DE" dirty="0"/>
+          </a:p>
+        </p:txBody>
+      </p:sp>
+    </p:spTree>
+    <p:extLst>
+      <p:ext uri="{BB962C8B-B14F-4D97-AF65-F5344CB8AC3E}">
+        <p14:creationId xmlns:p14="http://schemas.microsoft.com/office/powerpoint/2010/main" val="2637673204"/>
+      </p:ext>
+    </p:extLst>
+  </p:cSld>
+  <p:clrMapOvr>
+    <a:masterClrMapping/>
+  </p:clrMapOvr>
+</p:sld>
+</file>
+
+<file path=ppt/slides/slide5.xml><?xml version="1.0" encoding="utf-8"?>
+<p:sld xmlns:a="http://schemas.openxmlformats.org/drawingml/2006/main" xmlns:r="http://schemas.openxmlformats.org/officeDocument/2006/relationships" xmlns:p="http://schemas.openxmlformats.org/presentationml/2006/main">
+  <p:cSld>
+    <p:spTree>
+      <p:nvGrpSpPr>
+        <p:cNvPr id="1" name=""/>
+        <p:cNvGrpSpPr/>
+        <p:nvPr/>
+      </p:nvGrpSpPr>
+      <p:grpSpPr>
+        <a:xfrm>
+          <a:off x="0" y="0"/>
+          <a:ext cx="0" cy="0"/>
+          <a:chOff x="0" y="0"/>
+          <a:chExt cx="0" cy="0"/>
+        </a:xfrm>
+      </p:grpSpPr>
+      <p:sp>
+        <p:nvSpPr>
+          <p:cNvPr id="2" name="Titel 1"/>
+          <p:cNvSpPr>
+            <a:spLocks noGrp="1"/>
+          </p:cNvSpPr>
+          <p:nvPr>
+            <p:ph type="title"/>
+          </p:nvPr>
+        </p:nvSpPr>
+        <p:spPr/>
+        <p:txBody>
+          <a:bodyPr/>
+          <a:lstStyle/>
+          <a:p>
+            <a:r>
+              <a:rPr lang="de-DE" dirty="0"/>
+              <a:t>KI</a:t>
+            </a:r>
+          </a:p>
+        </p:txBody>
+      </p:sp>
+      <p:pic>
+        <p:nvPicPr>
+          <p:cNvPr id="3" name="Grafik 2"/>
+          <p:cNvPicPr>
+            <a:picLocks noChangeAspect="1"/>
+          </p:cNvPicPr>
+          <p:nvPr/>
+        </p:nvPicPr>
+        <p:blipFill>
+          <a:blip r:embed="rId2"/>
+          <a:stretch>
+            <a:fillRect/>
+          </a:stretch>
+        </p:blipFill>
+        <p:spPr>
+          <a:xfrm>
+            <a:off x="1827716" y="0"/>
+            <a:ext cx="8205642" cy="6858000"/>
+          </a:xfrm>
+          <a:prstGeom prst="rect">
+            <a:avLst/>
+          </a:prstGeom>
+        </p:spPr>
+      </p:pic>
+    </p:spTree>
+    <p:extLst>
+      <p:ext uri="{BB962C8B-B14F-4D97-AF65-F5344CB8AC3E}">
+        <p14:creationId xmlns:p14="http://schemas.microsoft.com/office/powerpoint/2010/main" val="1536122512"/>
+      </p:ext>
+    </p:extLst>
+  </p:cSld>
+  <p:clrMapOvr>
+    <a:masterClrMapping/>
+  </p:clrMapOvr>
+</p:sld>
+</file>
+
+<file path=ppt/slides/slide6.xml><?xml version="1.0" encoding="utf-8"?>
+<p:sld xmlns:a="http://schemas.openxmlformats.org/drawingml/2006/main" xmlns:r="http://schemas.openxmlformats.org/officeDocument/2006/relationships" xmlns:p="http://schemas.openxmlformats.org/presentationml/2006/main">
+  <p:cSld>
+    <p:spTree>
+      <p:nvGrpSpPr>
+        <p:cNvPr id="1" name=""/>
+        <p:cNvGrpSpPr/>
+        <p:nvPr/>
+      </p:nvGrpSpPr>
+      <p:grpSpPr>
+        <a:xfrm>
+          <a:off x="0" y="0"/>
+          <a:ext cx="0" cy="0"/>
+          <a:chOff x="0" y="0"/>
+          <a:chExt cx="0" cy="0"/>
+        </a:xfrm>
+      </p:grpSpPr>
+      <p:sp>
+        <p:nvSpPr>
+          <p:cNvPr id="2" name="Titel 1"/>
+          <p:cNvSpPr>
+            <a:spLocks noGrp="1"/>
+          </p:cNvSpPr>
+          <p:nvPr>
+            <p:ph type="title"/>
+          </p:nvPr>
+        </p:nvSpPr>
+        <p:spPr/>
+        <p:txBody>
+          <a:bodyPr/>
+          <a:lstStyle/>
+          <a:p>
+            <a:r>
+              <a:rPr lang="de-DE" dirty="0"/>
+              <a:t>Movement </a:t>
+            </a:r>
+          </a:p>
+        </p:txBody>
+      </p:sp>
+      <p:pic>
+        <p:nvPicPr>
+          <p:cNvPr id="4" name="Grafik 3"/>
+          <p:cNvPicPr>
+            <a:picLocks noChangeAspect="1"/>
+          </p:cNvPicPr>
+          <p:nvPr/>
+        </p:nvPicPr>
+        <p:blipFill>
+          <a:blip r:embed="rId2">
+            <a:extLst>
+              <a:ext uri="{28A0092B-C50C-407E-A947-70E740481C1C}">
+                <a14:useLocalDpi xmlns:a14="http://schemas.microsoft.com/office/drawing/2010/main" val="0"/>
+              </a:ext>
+            </a:extLst>
+          </a:blip>
+          <a:stretch>
+            <a:fillRect/>
+          </a:stretch>
+        </p:blipFill>
+        <p:spPr>
+          <a:xfrm>
+            <a:off x="4035357" y="0"/>
+            <a:ext cx="6002334" cy="6858000"/>
+          </a:xfrm>
+          <a:prstGeom prst="rect">
+            <a:avLst/>
+          </a:prstGeom>
+        </p:spPr>
+      </p:pic>
+    </p:spTree>
+    <p:extLst>
+      <p:ext uri="{BB962C8B-B14F-4D97-AF65-F5344CB8AC3E}">
+        <p14:creationId xmlns:p14="http://schemas.microsoft.com/office/powerpoint/2010/main" val="4194890001"/>
+      </p:ext>
+    </p:extLst>
+  </p:cSld>
+  <p:clrMapOvr>
+    <a:masterClrMapping/>
+  </p:clrMapOvr>
+</p:sld>
+</file>
+
+<file path=ppt/slides/slide7.xml><?xml version="1.0" encoding="utf-8"?>
+<p:sld xmlns:a="http://schemas.openxmlformats.org/drawingml/2006/main" xmlns:r="http://schemas.openxmlformats.org/officeDocument/2006/relationships" xmlns:p="http://schemas.openxmlformats.org/presentationml/2006/main">
+  <p:cSld>
+    <p:spTree>
+      <p:nvGrpSpPr>
+        <p:cNvPr id="1" name=""/>
+        <p:cNvGrpSpPr/>
+        <p:nvPr/>
+      </p:nvGrpSpPr>
+      <p:grpSpPr>
+        <a:xfrm>
+          <a:off x="0" y="0"/>
+          <a:ext cx="0" cy="0"/>
+          <a:chOff x="0" y="0"/>
+          <a:chExt cx="0" cy="0"/>
+        </a:xfrm>
+      </p:grpSpPr>
+      <p:sp>
+        <p:nvSpPr>
+          <p:cNvPr id="2" name="Titel 1"/>
+          <p:cNvSpPr>
+            <a:spLocks noGrp="1"/>
+          </p:cNvSpPr>
+          <p:nvPr>
+            <p:ph type="title"/>
+          </p:nvPr>
+        </p:nvSpPr>
+        <p:spPr/>
+        <p:txBody>
+          <a:bodyPr/>
+          <a:lstStyle/>
+          <a:p>
+            <a:r>
+              <a:rPr lang="de-DE" dirty="0"/>
+              <a:t>Verantwortungsbereich Robert</a:t>
+            </a:r>
+          </a:p>
+        </p:txBody>
+      </p:sp>
+      <p:sp>
+        <p:nvSpPr>
+          <p:cNvPr id="3" name="Inhaltsplatzhalter 2"/>
+          <p:cNvSpPr>
+            <a:spLocks noGrp="1"/>
+          </p:cNvSpPr>
+          <p:nvPr>
+            <p:ph idx="1"/>
+          </p:nvPr>
+        </p:nvSpPr>
+        <p:spPr/>
+        <p:txBody>
+          <a:bodyPr/>
+          <a:lstStyle/>
+          <a:p>
+            <a:r>
+              <a:rPr lang="de-DE" dirty="0"/>
+              <a:t>Levelgenerierung</a:t>
+            </a:r>
+          </a:p>
+          <a:p>
+            <a:r>
+              <a:rPr lang="de-DE" dirty="0"/>
+              <a:t>Attribute Spieler/Gegner</a:t>
+            </a:r>
+          </a:p>
+          <a:p>
+            <a:r>
+              <a:rPr lang="de-DE" dirty="0"/>
+              <a:t>UI</a:t>
+            </a:r>
+          </a:p>
+          <a:p>
+            <a:r>
+              <a:rPr lang="de-DE" dirty="0"/>
+              <a:t>Spieler- / Gegnerinteraktion</a:t>
+            </a:r>
+          </a:p>
+          <a:p>
+            <a:pPr marL="0" indent="0">
+              <a:buNone/>
+            </a:pPr>
+            <a:endParaRPr lang="de-DE" dirty="0"/>
+          </a:p>
+          <a:p>
+            <a:pPr marL="0" indent="0">
+              <a:buNone/>
+            </a:pPr>
+            <a:endParaRPr lang="de-DE" dirty="0"/>
+          </a:p>
+        </p:txBody>
+      </p:sp>
+    </p:spTree>
+    <p:extLst>
+      <p:ext uri="{BB962C8B-B14F-4D97-AF65-F5344CB8AC3E}">
+        <p14:creationId xmlns:p14="http://schemas.microsoft.com/office/powerpoint/2010/main" val="4266374917"/>
+      </p:ext>
+    </p:extLst>
+  </p:cSld>
+  <p:clrMapOvr>
+    <a:masterClrMapping/>
+  </p:clrMapOvr>
+</p:sld>
+</file>
+
+<file path=ppt/slides/slide8.xml><?xml version="1.0" encoding="utf-8"?>
+<p:sld xmlns:a="http://schemas.openxmlformats.org/drawingml/2006/main" xmlns:r="http://schemas.openxmlformats.org/officeDocument/2006/relationships" xmlns:p="http://schemas.openxmlformats.org/presentationml/2006/main">
+  <p:cSld>
+    <p:spTree>
+      <p:nvGrpSpPr>
+        <p:cNvPr id="1" name=""/>
+        <p:cNvGrpSpPr/>
+        <p:nvPr/>
+      </p:nvGrpSpPr>
+      <p:grpSpPr>
+        <a:xfrm>
+          <a:off x="0" y="0"/>
+          <a:ext cx="0" cy="0"/>
+          <a:chOff x="0" y="0"/>
+          <a:chExt cx="0" cy="0"/>
+        </a:xfrm>
+      </p:grpSpPr>
+      <p:sp>
+        <p:nvSpPr>
+          <p:cNvPr id="2" name="Titel 1">
+            <a:extLst>
+              <a:ext uri="{FF2B5EF4-FFF2-40B4-BE49-F238E27FC236}">
+                <a16:creationId xmlns:a16="http://schemas.microsoft.com/office/drawing/2014/main" id="{C4B3A167-4995-4F47-B43B-BFAA9E9250E5}"/>
+              </a:ext>
+            </a:extLst>
+          </p:cNvPr>
+          <p:cNvSpPr>
+            <a:spLocks noGrp="1"/>
+          </p:cNvSpPr>
+          <p:nvPr>
+            <p:ph type="title"/>
+          </p:nvPr>
+        </p:nvSpPr>
+        <p:spPr>
+          <a:xfrm>
+            <a:off x="241566" y="1424439"/>
+            <a:ext cx="10515600" cy="1325563"/>
+          </a:xfrm>
+        </p:spPr>
+        <p:txBody>
+          <a:bodyPr/>
+          <a:lstStyle/>
+          <a:p>
+            <a:r>
+              <a:rPr lang="de-DE" dirty="0"/>
+              <a:t>Levelgenerierung</a:t>
+            </a:r>
+          </a:p>
+        </p:txBody>
+      </p:sp>
+      <p:pic>
+        <p:nvPicPr>
+          <p:cNvPr id="5" name="Grafik 4">
+            <a:extLst>
+              <a:ext uri="{FF2B5EF4-FFF2-40B4-BE49-F238E27FC236}">
+                <a16:creationId xmlns:a16="http://schemas.microsoft.com/office/drawing/2014/main" id="{1B0565AC-AF87-4830-9510-6D933B6BDDDD}"/>
+              </a:ext>
+            </a:extLst>
+          </p:cNvPr>
+          <p:cNvPicPr>
+            <a:picLocks noChangeAspect="1"/>
+          </p:cNvPicPr>
+          <p:nvPr/>
+        </p:nvPicPr>
+        <p:blipFill rotWithShape="1">
+          <a:blip r:embed="rId2"/>
+          <a:srcRect l="3107" t="12256" r="56136" b="28216"/>
+          <a:stretch/>
+        </p:blipFill>
+        <p:spPr>
+          <a:xfrm>
+            <a:off x="4349930" y="271784"/>
+            <a:ext cx="7842070" cy="6442745"/>
+          </a:xfrm>
+          <a:prstGeom prst="rect">
+            <a:avLst/>
+          </a:prstGeom>
+        </p:spPr>
+      </p:pic>
+    </p:spTree>
+    <p:extLst>
+      <p:ext uri="{BB962C8B-B14F-4D97-AF65-F5344CB8AC3E}">
+        <p14:creationId xmlns:p14="http://schemas.microsoft.com/office/powerpoint/2010/main" val="776229417"/>
+      </p:ext>
+    </p:extLst>
+  </p:cSld>
+  <p:clrMapOvr>
+    <a:masterClrMapping/>
+  </p:clrMapOvr>
+</p:sld>
+</file>
+
+<file path=ppt/slides/slide9.xml><?xml version="1.0" encoding="utf-8"?>
+<p:sld xmlns:a="http://schemas.openxmlformats.org/drawingml/2006/main" xmlns:r="http://schemas.openxmlformats.org/officeDocument/2006/relationships" xmlns:p="http://schemas.openxmlformats.org/presentationml/2006/main">
+  <p:cSld>
+    <p:spTree>
+      <p:nvGrpSpPr>
+        <p:cNvPr id="1" name=""/>
+        <p:cNvGrpSpPr/>
+        <p:nvPr/>
+      </p:nvGrpSpPr>
+      <p:grpSpPr>
+        <a:xfrm>
+          <a:off x="0" y="0"/>
+          <a:ext cx="0" cy="0"/>
+          <a:chOff x="0" y="0"/>
+          <a:chExt cx="0" cy="0"/>
+        </a:xfrm>
+      </p:grpSpPr>
+      <p:sp>
+        <p:nvSpPr>
+          <p:cNvPr id="2" name="Titel 1">
+            <a:extLst>
+              <a:ext uri="{FF2B5EF4-FFF2-40B4-BE49-F238E27FC236}">
+                <a16:creationId xmlns:a16="http://schemas.microsoft.com/office/drawing/2014/main" id="{1B09397A-EE71-4ACA-BA78-02E710E93D7E}"/>
+              </a:ext>
+            </a:extLst>
+          </p:cNvPr>
+          <p:cNvSpPr>
+            <a:spLocks noGrp="1"/>
+          </p:cNvSpPr>
+          <p:nvPr>
+            <p:ph type="title"/>
+          </p:nvPr>
+        </p:nvSpPr>
+        <p:spPr/>
+        <p:txBody>
+          <a:bodyPr/>
+          <a:lstStyle/>
+          <a:p>
+            <a:r>
+              <a:rPr lang="de-DE" dirty="0"/>
+              <a:t>Player </a:t>
+            </a:r>
+            <a:r>
+              <a:rPr lang="de-DE" dirty="0" err="1"/>
+              <a:t>Attack</a:t>
+            </a:r>
+            <a:endParaRPr lang="de-DE" dirty="0"/>
+          </a:p>
+        </p:txBody>
+      </p:sp>
+      <p:pic>
+        <p:nvPicPr>
+          <p:cNvPr id="4" name="Grafik 3">
+            <a:extLst>
+              <a:ext uri="{FF2B5EF4-FFF2-40B4-BE49-F238E27FC236}">
+                <a16:creationId xmlns:a16="http://schemas.microsoft.com/office/drawing/2014/main" id="{F9B755B4-6054-4E44-9D0D-64FD43E77E54}"/>
+              </a:ext>
+            </a:extLst>
+          </p:cNvPr>
+          <p:cNvPicPr>
+            <a:picLocks noChangeAspect="1"/>
+          </p:cNvPicPr>
+          <p:nvPr/>
+        </p:nvPicPr>
+        <p:blipFill rotWithShape="1">
+          <a:blip r:embed="rId2"/>
+          <a:srcRect l="3259" t="36545" r="61363" b="34276"/>
+          <a:stretch/>
+        </p:blipFill>
+        <p:spPr>
+          <a:xfrm>
+            <a:off x="0" y="2340528"/>
+            <a:ext cx="6093906" cy="2827089"/>
+          </a:xfrm>
+          <a:prstGeom prst="rect">
+            <a:avLst/>
+          </a:prstGeom>
+        </p:spPr>
+      </p:pic>
+      <p:pic>
+        <p:nvPicPr>
+          <p:cNvPr id="5" name="Grafik 4">
+            <a:extLst>
+              <a:ext uri="{FF2B5EF4-FFF2-40B4-BE49-F238E27FC236}">
+                <a16:creationId xmlns:a16="http://schemas.microsoft.com/office/drawing/2014/main" id="{BD953A0F-6E4C-4FFC-B346-58AFFF82D9A5}"/>
+              </a:ext>
+            </a:extLst>
+          </p:cNvPr>
+          <p:cNvPicPr>
+            <a:picLocks noChangeAspect="1"/>
+          </p:cNvPicPr>
+          <p:nvPr/>
+        </p:nvPicPr>
+        <p:blipFill rotWithShape="1">
+          <a:blip r:embed="rId3"/>
+          <a:srcRect l="3106" t="24652" r="64242" b="34546"/>
+          <a:stretch/>
+        </p:blipFill>
+        <p:spPr>
+          <a:xfrm>
+            <a:off x="6087397" y="1367405"/>
+            <a:ext cx="6104603" cy="4290969"/>
+          </a:xfrm>
+          <a:prstGeom prst="rect">
+            <a:avLst/>
+          </a:prstGeom>
+        </p:spPr>
+      </p:pic>
+    </p:spTree>
+    <p:extLst>
+      <p:ext uri="{BB962C8B-B14F-4D97-AF65-F5344CB8AC3E}">
+        <p14:creationId xmlns:p14="http://schemas.microsoft.com/office/powerpoint/2010/main" val="567842348"/>
+      </p:ext>
+    </p:extLst>
+  </p:cSld>
+  <p:clrMapOvr>
+    <a:masterClrMapping/>
+  </p:clrMapOvr>
 </p:sld>
 </file>
 

</xml_diff>

<commit_message>
So diese Präsi auch angepasst
</commit_message>
<xml_diff>
--- a/12-Skymensions-JanzenQuanzJonetzko.pptx
+++ b/12-Skymensions-JanzenQuanzJonetzko.pptx
@@ -15,7 +15,9 @@
     <p:sldId id="269" r:id="rId9"/>
     <p:sldId id="270" r:id="rId10"/>
     <p:sldId id="266" r:id="rId11"/>
-    <p:sldId id="261" r:id="rId12"/>
+    <p:sldId id="271" r:id="rId12"/>
+    <p:sldId id="272" r:id="rId13"/>
+    <p:sldId id="261" r:id="rId14"/>
   </p:sldIdLst>
   <p:sldSz cx="12192000" cy="6858000"/>
   <p:notesSz cx="6858000" cy="9144000"/>
@@ -3095,7 +3097,7 @@
         <p:spPr>
           <a:xfrm>
             <a:off x="838200" y="1825625"/>
-            <a:ext cx="3707674" cy="4351338"/>
+            <a:ext cx="4254500" cy="4351338"/>
           </a:xfrm>
         </p:spPr>
         <p:txBody>
@@ -3110,14 +3112,31 @@
           <a:p>
             <a:r>
               <a:rPr lang="de-DE" dirty="0"/>
-              <a:t>Item Drop</a:t>
+              <a:t>Item Drop /Item Design</a:t>
             </a:r>
           </a:p>
           <a:p>
             <a:r>
               <a:rPr lang="de-DE" dirty="0"/>
-              <a:t>Item Design</a:t>
-            </a:r>
+              <a:t>Neue Level Generierung</a:t>
+            </a:r>
+          </a:p>
+          <a:p>
+            <a:r>
+              <a:rPr lang="de-DE" dirty="0"/>
+              <a:t>Tod/</a:t>
+            </a:r>
+            <a:r>
+              <a:rPr lang="de-DE" dirty="0" err="1"/>
+              <a:t>Reset</a:t>
+            </a:r>
+            <a:r>
+              <a:rPr lang="de-DE" dirty="0"/>
+              <a:t> </a:t>
+            </a:r>
+          </a:p>
+          <a:p>
+            <a:endParaRPr lang="de-DE" dirty="0"/>
           </a:p>
           <a:p>
             <a:endParaRPr lang="de-DE" dirty="0"/>
@@ -3144,6 +3163,487 @@
 </file>
 
 <file path=ppt/slides/slide11.xml><?xml version="1.0" encoding="utf-8"?>
+<p:sld xmlns:a="http://schemas.openxmlformats.org/drawingml/2006/main" xmlns:r="http://schemas.openxmlformats.org/officeDocument/2006/relationships" xmlns:p="http://schemas.openxmlformats.org/presentationml/2006/main">
+  <p:cSld>
+    <p:bg>
+      <p:bgPr>
+        <a:solidFill>
+          <a:schemeClr val="bg2">
+            <a:lumMod val="10000"/>
+          </a:schemeClr>
+        </a:solidFill>
+        <a:effectLst/>
+      </p:bgPr>
+    </p:bg>
+    <p:spTree>
+      <p:nvGrpSpPr>
+        <p:cNvPr id="1" name=""/>
+        <p:cNvGrpSpPr/>
+        <p:nvPr/>
+      </p:nvGrpSpPr>
+      <p:grpSpPr>
+        <a:xfrm>
+          <a:off x="0" y="0"/>
+          <a:ext cx="0" cy="0"/>
+          <a:chOff x="0" y="0"/>
+          <a:chExt cx="0" cy="0"/>
+        </a:xfrm>
+      </p:grpSpPr>
+      <p:pic>
+        <p:nvPicPr>
+          <p:cNvPr id="1026" name="Picture 2" descr=" Grabilla screen capture: ">
+            <a:extLst>
+              <a:ext uri="{FF2B5EF4-FFF2-40B4-BE49-F238E27FC236}">
+                <a16:creationId xmlns:a16="http://schemas.microsoft.com/office/drawing/2014/main" id="{058574A1-48D0-4AB1-AD50-A2AF317F1F2D}"/>
+              </a:ext>
+            </a:extLst>
+          </p:cNvPr>
+          <p:cNvPicPr>
+            <a:picLocks noChangeAspect="1" noChangeArrowheads="1"/>
+          </p:cNvPicPr>
+          <p:nvPr/>
+        </p:nvPicPr>
+        <p:blipFill>
+          <a:blip r:embed="rId2">
+            <a:extLst>
+              <a:ext uri="{28A0092B-C50C-407E-A947-70E740481C1C}">
+                <a14:useLocalDpi xmlns:a14="http://schemas.microsoft.com/office/drawing/2010/main" val="0"/>
+              </a:ext>
+            </a:extLst>
+          </a:blip>
+          <a:srcRect/>
+          <a:stretch>
+            <a:fillRect/>
+          </a:stretch>
+        </p:blipFill>
+        <p:spPr bwMode="auto">
+          <a:xfrm>
+            <a:off x="7121525" y="0"/>
+            <a:ext cx="5070475" cy="6858000"/>
+          </a:xfrm>
+          <a:prstGeom prst="rect">
+            <a:avLst/>
+          </a:prstGeom>
+          <a:noFill/>
+          <a:extLst>
+            <a:ext uri="{909E8E84-426E-40DD-AFC4-6F175D3DCCD1}">
+              <a14:hiddenFill xmlns:a14="http://schemas.microsoft.com/office/drawing/2010/main">
+                <a:solidFill>
+                  <a:srgbClr val="FFFFFF"/>
+                </a:solidFill>
+              </a14:hiddenFill>
+            </a:ext>
+          </a:extLst>
+        </p:spPr>
+      </p:pic>
+      <p:sp>
+        <p:nvSpPr>
+          <p:cNvPr id="4" name="Textfeld 3">
+            <a:extLst>
+              <a:ext uri="{FF2B5EF4-FFF2-40B4-BE49-F238E27FC236}">
+                <a16:creationId xmlns:a16="http://schemas.microsoft.com/office/drawing/2014/main" id="{599D63F9-13C9-48E9-A1D9-A5440BFC839E}"/>
+              </a:ext>
+            </a:extLst>
+          </p:cNvPr>
+          <p:cNvSpPr txBox="1"/>
+          <p:nvPr/>
+        </p:nvSpPr>
+        <p:spPr>
+          <a:xfrm>
+            <a:off x="10380663" y="165100"/>
+            <a:ext cx="3365500" cy="769441"/>
+          </a:xfrm>
+          <a:prstGeom prst="rect">
+            <a:avLst/>
+          </a:prstGeom>
+          <a:noFill/>
+        </p:spPr>
+        <p:txBody>
+          <a:bodyPr wrap="square" rtlCol="0">
+            <a:spAutoFit/>
+          </a:bodyPr>
+          <a:lstStyle/>
+          <a:p>
+            <a:r>
+              <a:rPr lang="de-DE" sz="4400" dirty="0">
+                <a:solidFill>
+                  <a:schemeClr val="bg1"/>
+                </a:solidFill>
+              </a:rPr>
+              <a:t>Menü</a:t>
+            </a:r>
+            <a:endParaRPr lang="de-DE" dirty="0">
+              <a:solidFill>
+                <a:schemeClr val="bg1"/>
+              </a:solidFill>
+            </a:endParaRPr>
+          </a:p>
+        </p:txBody>
+      </p:sp>
+      <p:pic>
+        <p:nvPicPr>
+          <p:cNvPr id="6" name="Picture 2" descr=" Grabilla screen capture: ">
+            <a:extLst>
+              <a:ext uri="{FF2B5EF4-FFF2-40B4-BE49-F238E27FC236}">
+                <a16:creationId xmlns:a16="http://schemas.microsoft.com/office/drawing/2014/main" id="{402164D4-0929-4264-94AC-1FFF497FD619}"/>
+              </a:ext>
+            </a:extLst>
+          </p:cNvPr>
+          <p:cNvPicPr>
+            <a:picLocks noChangeAspect="1" noChangeArrowheads="1"/>
+          </p:cNvPicPr>
+          <p:nvPr/>
+        </p:nvPicPr>
+        <p:blipFill>
+          <a:blip r:embed="rId3">
+            <a:extLst>
+              <a:ext uri="{28A0092B-C50C-407E-A947-70E740481C1C}">
+                <a14:useLocalDpi xmlns:a14="http://schemas.microsoft.com/office/drawing/2010/main" val="0"/>
+              </a:ext>
+            </a:extLst>
+          </a:blip>
+          <a:srcRect/>
+          <a:stretch>
+            <a:fillRect/>
+          </a:stretch>
+        </p:blipFill>
+        <p:spPr bwMode="auto">
+          <a:xfrm>
+            <a:off x="508000" y="1590675"/>
+            <a:ext cx="6286500" cy="3676650"/>
+          </a:xfrm>
+          <a:prstGeom prst="rect">
+            <a:avLst/>
+          </a:prstGeom>
+          <a:noFill/>
+          <a:extLst>
+            <a:ext uri="{909E8E84-426E-40DD-AFC4-6F175D3DCCD1}">
+              <a14:hiddenFill xmlns:a14="http://schemas.microsoft.com/office/drawing/2010/main">
+                <a:solidFill>
+                  <a:srgbClr val="FFFFFF"/>
+                </a:solidFill>
+              </a14:hiddenFill>
+            </a:ext>
+          </a:extLst>
+        </p:spPr>
+      </p:pic>
+      <p:sp>
+        <p:nvSpPr>
+          <p:cNvPr id="5" name="Textfeld 4">
+            <a:extLst>
+              <a:ext uri="{FF2B5EF4-FFF2-40B4-BE49-F238E27FC236}">
+                <a16:creationId xmlns:a16="http://schemas.microsoft.com/office/drawing/2014/main" id="{B4EB1B58-4BA3-44C2-8F9B-A8B5232A20AE}"/>
+              </a:ext>
+            </a:extLst>
+          </p:cNvPr>
+          <p:cNvSpPr txBox="1"/>
+          <p:nvPr/>
+        </p:nvSpPr>
+        <p:spPr>
+          <a:xfrm>
+            <a:off x="3429000" y="1841500"/>
+            <a:ext cx="2667000" cy="769441"/>
+          </a:xfrm>
+          <a:prstGeom prst="rect">
+            <a:avLst/>
+          </a:prstGeom>
+          <a:noFill/>
+        </p:spPr>
+        <p:txBody>
+          <a:bodyPr wrap="square" rtlCol="0">
+            <a:spAutoFit/>
+          </a:bodyPr>
+          <a:lstStyle/>
+          <a:p>
+            <a:r>
+              <a:rPr lang="de-DE" sz="4400" dirty="0">
+                <a:solidFill>
+                  <a:schemeClr val="bg1"/>
+                </a:solidFill>
+              </a:rPr>
+              <a:t>Item</a:t>
+            </a:r>
+          </a:p>
+        </p:txBody>
+      </p:sp>
+    </p:spTree>
+    <p:extLst>
+      <p:ext uri="{BB962C8B-B14F-4D97-AF65-F5344CB8AC3E}">
+        <p14:creationId xmlns:p14="http://schemas.microsoft.com/office/powerpoint/2010/main" val="3196619686"/>
+      </p:ext>
+    </p:extLst>
+  </p:cSld>
+  <p:clrMapOvr>
+    <a:masterClrMapping/>
+  </p:clrMapOvr>
+</p:sld>
+</file>
+
+<file path=ppt/slides/slide12.xml><?xml version="1.0" encoding="utf-8"?>
+<p:sld xmlns:a="http://schemas.openxmlformats.org/drawingml/2006/main" xmlns:r="http://schemas.openxmlformats.org/officeDocument/2006/relationships" xmlns:p="http://schemas.openxmlformats.org/presentationml/2006/main">
+  <p:cSld>
+    <p:bg>
+      <p:bgPr>
+        <a:solidFill>
+          <a:schemeClr val="bg2">
+            <a:lumMod val="10000"/>
+          </a:schemeClr>
+        </a:solidFill>
+        <a:effectLst/>
+      </p:bgPr>
+    </p:bg>
+    <p:spTree>
+      <p:nvGrpSpPr>
+        <p:cNvPr id="1" name=""/>
+        <p:cNvGrpSpPr/>
+        <p:nvPr/>
+      </p:nvGrpSpPr>
+      <p:grpSpPr>
+        <a:xfrm>
+          <a:off x="0" y="0"/>
+          <a:ext cx="0" cy="0"/>
+          <a:chOff x="0" y="0"/>
+          <a:chExt cx="0" cy="0"/>
+        </a:xfrm>
+      </p:grpSpPr>
+      <p:pic>
+        <p:nvPicPr>
+          <p:cNvPr id="2052" name="Picture 4" descr=" Grabilla screen capture: ">
+            <a:extLst>
+              <a:ext uri="{FF2B5EF4-FFF2-40B4-BE49-F238E27FC236}">
+                <a16:creationId xmlns:a16="http://schemas.microsoft.com/office/drawing/2014/main" id="{D13DE5D2-7186-46A6-B50A-537C8EE770F5}"/>
+              </a:ext>
+            </a:extLst>
+          </p:cNvPr>
+          <p:cNvPicPr>
+            <a:picLocks noChangeAspect="1" noChangeArrowheads="1"/>
+          </p:cNvPicPr>
+          <p:nvPr/>
+        </p:nvPicPr>
+        <p:blipFill>
+          <a:blip r:embed="rId2">
+            <a:extLst>
+              <a:ext uri="{28A0092B-C50C-407E-A947-70E740481C1C}">
+                <a14:useLocalDpi xmlns:a14="http://schemas.microsoft.com/office/drawing/2010/main" val="0"/>
+              </a:ext>
+            </a:extLst>
+          </a:blip>
+          <a:srcRect/>
+          <a:stretch>
+            <a:fillRect/>
+          </a:stretch>
+        </p:blipFill>
+        <p:spPr bwMode="auto">
+          <a:xfrm>
+            <a:off x="381000" y="1579088"/>
+            <a:ext cx="5715000" cy="3699823"/>
+          </a:xfrm>
+          <a:prstGeom prst="rect">
+            <a:avLst/>
+          </a:prstGeom>
+          <a:noFill/>
+          <a:extLst>
+            <a:ext uri="{909E8E84-426E-40DD-AFC4-6F175D3DCCD1}">
+              <a14:hiddenFill xmlns:a14="http://schemas.microsoft.com/office/drawing/2010/main">
+                <a:solidFill>
+                  <a:srgbClr val="FFFFFF"/>
+                </a:solidFill>
+              </a14:hiddenFill>
+            </a:ext>
+          </a:extLst>
+        </p:spPr>
+      </p:pic>
+      <p:pic>
+        <p:nvPicPr>
+          <p:cNvPr id="2054" name="Picture 6" descr=" Grabilla screen capture: ">
+            <a:extLst>
+              <a:ext uri="{FF2B5EF4-FFF2-40B4-BE49-F238E27FC236}">
+                <a16:creationId xmlns:a16="http://schemas.microsoft.com/office/drawing/2014/main" id="{75565E06-7C9A-481F-BC2A-03DF27EEE91D}"/>
+              </a:ext>
+            </a:extLst>
+          </p:cNvPr>
+          <p:cNvPicPr>
+            <a:picLocks noChangeAspect="1" noChangeArrowheads="1"/>
+          </p:cNvPicPr>
+          <p:nvPr/>
+        </p:nvPicPr>
+        <p:blipFill>
+          <a:blip r:embed="rId3">
+            <a:extLst>
+              <a:ext uri="{28A0092B-C50C-407E-A947-70E740481C1C}">
+                <a14:useLocalDpi xmlns:a14="http://schemas.microsoft.com/office/drawing/2010/main" val="0"/>
+              </a:ext>
+            </a:extLst>
+          </a:blip>
+          <a:srcRect/>
+          <a:stretch>
+            <a:fillRect/>
+          </a:stretch>
+        </p:blipFill>
+        <p:spPr bwMode="auto">
+          <a:xfrm>
+            <a:off x="7515225" y="1487013"/>
+            <a:ext cx="3162300" cy="752475"/>
+          </a:xfrm>
+          <a:prstGeom prst="rect">
+            <a:avLst/>
+          </a:prstGeom>
+          <a:noFill/>
+          <a:extLst>
+            <a:ext uri="{909E8E84-426E-40DD-AFC4-6F175D3DCCD1}">
+              <a14:hiddenFill xmlns:a14="http://schemas.microsoft.com/office/drawing/2010/main">
+                <a:solidFill>
+                  <a:srgbClr val="FFFFFF"/>
+                </a:solidFill>
+              </a14:hiddenFill>
+            </a:ext>
+          </a:extLst>
+        </p:spPr>
+      </p:pic>
+      <p:pic>
+        <p:nvPicPr>
+          <p:cNvPr id="2056" name="Picture 8" descr=" Grabilla screen capture: ">
+            <a:extLst>
+              <a:ext uri="{FF2B5EF4-FFF2-40B4-BE49-F238E27FC236}">
+                <a16:creationId xmlns:a16="http://schemas.microsoft.com/office/drawing/2014/main" id="{E6464033-4DCB-41E5-9D5C-FD5DCABB9C4D}"/>
+              </a:ext>
+            </a:extLst>
+          </p:cNvPr>
+          <p:cNvPicPr>
+            <a:picLocks noChangeAspect="1" noChangeArrowheads="1"/>
+          </p:cNvPicPr>
+          <p:nvPr/>
+        </p:nvPicPr>
+        <p:blipFill>
+          <a:blip r:embed="rId4">
+            <a:extLst>
+              <a:ext uri="{28A0092B-C50C-407E-A947-70E740481C1C}">
+                <a14:useLocalDpi xmlns:a14="http://schemas.microsoft.com/office/drawing/2010/main" val="0"/>
+              </a:ext>
+            </a:extLst>
+          </a:blip>
+          <a:srcRect/>
+          <a:stretch>
+            <a:fillRect/>
+          </a:stretch>
+        </p:blipFill>
+        <p:spPr bwMode="auto">
+          <a:xfrm>
+            <a:off x="6381750" y="2738436"/>
+            <a:ext cx="5429250" cy="1381125"/>
+          </a:xfrm>
+          <a:prstGeom prst="rect">
+            <a:avLst/>
+          </a:prstGeom>
+          <a:noFill/>
+          <a:extLst>
+            <a:ext uri="{909E8E84-426E-40DD-AFC4-6F175D3DCCD1}">
+              <a14:hiddenFill xmlns:a14="http://schemas.microsoft.com/office/drawing/2010/main">
+                <a:solidFill>
+                  <a:srgbClr val="FFFFFF"/>
+                </a:solidFill>
+              </a14:hiddenFill>
+            </a:ext>
+          </a:extLst>
+        </p:spPr>
+      </p:pic>
+      <p:sp>
+        <p:nvSpPr>
+          <p:cNvPr id="5" name="Textfeld 4">
+            <a:extLst>
+              <a:ext uri="{FF2B5EF4-FFF2-40B4-BE49-F238E27FC236}">
+                <a16:creationId xmlns:a16="http://schemas.microsoft.com/office/drawing/2014/main" id="{2C6B6840-7DF3-4703-8637-86388320880A}"/>
+              </a:ext>
+            </a:extLst>
+          </p:cNvPr>
+          <p:cNvSpPr txBox="1"/>
+          <p:nvPr/>
+        </p:nvSpPr>
+        <p:spPr>
+          <a:xfrm>
+            <a:off x="3429000" y="1593157"/>
+            <a:ext cx="2514600" cy="646331"/>
+          </a:xfrm>
+          <a:prstGeom prst="rect">
+            <a:avLst/>
+          </a:prstGeom>
+          <a:noFill/>
+        </p:spPr>
+        <p:txBody>
+          <a:bodyPr wrap="square" rtlCol="0">
+            <a:spAutoFit/>
+          </a:bodyPr>
+          <a:lstStyle/>
+          <a:p>
+            <a:r>
+              <a:rPr lang="de-DE" sz="3600" dirty="0">
+                <a:solidFill>
+                  <a:schemeClr val="bg1"/>
+                </a:solidFill>
+              </a:rPr>
+              <a:t>Neues Level</a:t>
+            </a:r>
+          </a:p>
+        </p:txBody>
+      </p:sp>
+      <p:sp>
+        <p:nvSpPr>
+          <p:cNvPr id="6" name="Textfeld 5">
+            <a:extLst>
+              <a:ext uri="{FF2B5EF4-FFF2-40B4-BE49-F238E27FC236}">
+                <a16:creationId xmlns:a16="http://schemas.microsoft.com/office/drawing/2014/main" id="{7042C137-5BB7-41A1-BBA0-E58BFE90A63E}"/>
+              </a:ext>
+            </a:extLst>
+          </p:cNvPr>
+          <p:cNvSpPr txBox="1"/>
+          <p:nvPr/>
+        </p:nvSpPr>
+        <p:spPr>
+          <a:xfrm>
+            <a:off x="10337800" y="2738436"/>
+            <a:ext cx="1308100" cy="646331"/>
+          </a:xfrm>
+          <a:prstGeom prst="rect">
+            <a:avLst/>
+          </a:prstGeom>
+          <a:noFill/>
+        </p:spPr>
+        <p:txBody>
+          <a:bodyPr wrap="square" rtlCol="0">
+            <a:spAutoFit/>
+          </a:bodyPr>
+          <a:lstStyle/>
+          <a:p>
+            <a:r>
+              <a:rPr lang="de-DE" sz="3600" dirty="0" err="1">
+                <a:solidFill>
+                  <a:schemeClr val="bg1"/>
+                </a:solidFill>
+              </a:rPr>
+              <a:t>Reset</a:t>
+            </a:r>
+            <a:endParaRPr lang="de-DE" sz="3600" dirty="0">
+              <a:solidFill>
+                <a:schemeClr val="bg1"/>
+              </a:solidFill>
+            </a:endParaRPr>
+          </a:p>
+        </p:txBody>
+      </p:sp>
+    </p:spTree>
+    <p:extLst>
+      <p:ext uri="{BB962C8B-B14F-4D97-AF65-F5344CB8AC3E}">
+        <p14:creationId xmlns:p14="http://schemas.microsoft.com/office/powerpoint/2010/main" val="3854050808"/>
+      </p:ext>
+    </p:extLst>
+  </p:cSld>
+  <p:clrMapOvr>
+    <a:masterClrMapping/>
+  </p:clrMapOvr>
+</p:sld>
+</file>
+
+<file path=ppt/slides/slide13.xml><?xml version="1.0" encoding="utf-8"?>
 <p:sld xmlns:a="http://schemas.openxmlformats.org/drawingml/2006/main" xmlns:r="http://schemas.openxmlformats.org/officeDocument/2006/relationships" xmlns:p="http://schemas.openxmlformats.org/presentationml/2006/main">
   <p:cSld>
     <p:spTree>

</xml_diff>